<commit_message>
Update final presentation ppt
</commit_message>
<xml_diff>
--- a/wsnlab-ss25-final-group2.pptx
+++ b/wsnlab-ss25-final-group2.pptx
@@ -10,10 +10,16 @@
     <p:sldId id="425" r:id="rId4"/>
     <p:sldId id="257" r:id="rId5"/>
     <p:sldId id="258" r:id="rId6"/>
-    <p:sldId id="357" r:id="rId7"/>
-    <p:sldId id="358" r:id="rId8"/>
-    <p:sldId id="265" r:id="rId9"/>
-    <p:sldId id="262" r:id="rId10"/>
+    <p:sldId id="429" r:id="rId7"/>
+    <p:sldId id="430" r:id="rId8"/>
+    <p:sldId id="432" r:id="rId9"/>
+    <p:sldId id="431" r:id="rId10"/>
+    <p:sldId id="357" r:id="rId11"/>
+    <p:sldId id="358" r:id="rId12"/>
+    <p:sldId id="426" r:id="rId13"/>
+    <p:sldId id="427" r:id="rId14"/>
+    <p:sldId id="428" r:id="rId15"/>
+    <p:sldId id="262" r:id="rId16"/>
   </p:sldIdLst>
   <p:sldSz cx="12192000" cy="6858000"/>
   <p:notesSz cx="6858000" cy="9144000"/>
@@ -1192,6 +1198,36 @@
           </a:p>
         </p:txBody>
       </p:sp>
+      <p:pic>
+        <p:nvPicPr>
+          <p:cNvPr id="7" name="图片 6">
+            <a:extLst>
+              <a:ext uri="{FF2B5EF4-FFF2-40B4-BE49-F238E27FC236}">
+                <a16:creationId xmlns:a16="http://schemas.microsoft.com/office/drawing/2014/main" id="{A9203A37-759F-A2D3-9702-C1107CD3BA84}"/>
+              </a:ext>
+            </a:extLst>
+          </p:cNvPr>
+          <p:cNvPicPr>
+            <a:picLocks noChangeAspect="1"/>
+          </p:cNvPicPr>
+          <p:nvPr userDrawn="1"/>
+        </p:nvPicPr>
+        <p:blipFill>
+          <a:blip r:embed="rId2"/>
+          <a:stretch>
+            <a:fillRect/>
+          </a:stretch>
+        </p:blipFill>
+        <p:spPr>
+          <a:xfrm>
+            <a:off x="10082895" y="370856"/>
+            <a:ext cx="1270905" cy="659432"/>
+          </a:xfrm>
+          <a:prstGeom prst="rect">
+            <a:avLst/>
+          </a:prstGeom>
+        </p:spPr>
+      </p:pic>
     </p:spTree>
   </p:cSld>
   <p:clrMapOvr>
@@ -3527,6 +3563,36 @@
           </a:p>
         </p:txBody>
       </p:sp>
+      <p:pic>
+        <p:nvPicPr>
+          <p:cNvPr id="7" name="图片 6">
+            <a:extLst>
+              <a:ext uri="{FF2B5EF4-FFF2-40B4-BE49-F238E27FC236}">
+                <a16:creationId xmlns:a16="http://schemas.microsoft.com/office/drawing/2014/main" id="{162C9239-563C-9C30-B871-ACD0FAF31798}"/>
+              </a:ext>
+            </a:extLst>
+          </p:cNvPr>
+          <p:cNvPicPr>
+            <a:picLocks noChangeAspect="1"/>
+          </p:cNvPicPr>
+          <p:nvPr userDrawn="1"/>
+        </p:nvPicPr>
+        <p:blipFill>
+          <a:blip r:embed="rId2"/>
+          <a:stretch>
+            <a:fillRect/>
+          </a:stretch>
+        </p:blipFill>
+        <p:spPr>
+          <a:xfrm>
+            <a:off x="9922246" y="554147"/>
+            <a:ext cx="1270905" cy="659432"/>
+          </a:xfrm>
+          <a:prstGeom prst="rect">
+            <a:avLst/>
+          </a:prstGeom>
+        </p:spPr>
+      </p:pic>
     </p:spTree>
   </p:cSld>
   <p:clrMapOvr>
@@ -4625,6 +4691,36 @@
           </a:p>
         </p:txBody>
       </p:sp>
+      <p:pic>
+        <p:nvPicPr>
+          <p:cNvPr id="7" name="图片 6">
+            <a:extLst>
+              <a:ext uri="{FF2B5EF4-FFF2-40B4-BE49-F238E27FC236}">
+                <a16:creationId xmlns:a16="http://schemas.microsoft.com/office/drawing/2014/main" id="{9315167D-941A-6919-DDE1-744E3DFDA136}"/>
+              </a:ext>
+            </a:extLst>
+          </p:cNvPr>
+          <p:cNvPicPr>
+            <a:picLocks noChangeAspect="1"/>
+          </p:cNvPicPr>
+          <p:nvPr userDrawn="1"/>
+        </p:nvPicPr>
+        <p:blipFill>
+          <a:blip r:embed="rId2"/>
+          <a:stretch>
+            <a:fillRect/>
+          </a:stretch>
+        </p:blipFill>
+        <p:spPr>
+          <a:xfrm>
+            <a:off x="10268077" y="438634"/>
+            <a:ext cx="1270905" cy="659432"/>
+          </a:xfrm>
+          <a:prstGeom prst="rect">
+            <a:avLst/>
+          </a:prstGeom>
+        </p:spPr>
+      </p:pic>
     </p:spTree>
   </p:cSld>
   <p:clrMapOvr>
@@ -7936,6 +8032,467 @@
 </p:sld>
 </file>
 
+<file path=ppt/slides/slide10.xml><?xml version="1.0" encoding="utf-8"?>
+<p:sld xmlns:a="http://schemas.openxmlformats.org/drawingml/2006/main" xmlns:r="http://schemas.openxmlformats.org/officeDocument/2006/relationships" xmlns:p="http://schemas.openxmlformats.org/presentationml/2006/main">
+  <p:cSld>
+    <p:spTree>
+      <p:nvGrpSpPr>
+        <p:cNvPr id="1" name="">
+          <a:extLst>
+            <a:ext uri="{FF2B5EF4-FFF2-40B4-BE49-F238E27FC236}">
+              <a16:creationId xmlns:a16="http://schemas.microsoft.com/office/drawing/2014/main" id="{44FB16A6-A5F0-DCAC-8200-54363589F528}"/>
+            </a:ext>
+          </a:extLst>
+        </p:cNvPr>
+        <p:cNvGrpSpPr/>
+        <p:nvPr/>
+      </p:nvGrpSpPr>
+      <p:grpSpPr>
+        <a:xfrm>
+          <a:off x="0" y="0"/>
+          <a:ext cx="0" cy="0"/>
+          <a:chOff x="0" y="0"/>
+          <a:chExt cx="0" cy="0"/>
+        </a:xfrm>
+      </p:grpSpPr>
+      <p:sp>
+        <p:nvSpPr>
+          <p:cNvPr id="4" name="标题 3">
+            <a:extLst>
+              <a:ext uri="{FF2B5EF4-FFF2-40B4-BE49-F238E27FC236}">
+                <a16:creationId xmlns:a16="http://schemas.microsoft.com/office/drawing/2014/main" id="{9BA46F41-84C7-7A44-E258-BE779E59565F}"/>
+              </a:ext>
+            </a:extLst>
+          </p:cNvPr>
+          <p:cNvSpPr>
+            <a:spLocks noGrp="1"/>
+          </p:cNvSpPr>
+          <p:nvPr>
+            <p:ph type="title"/>
+          </p:nvPr>
+        </p:nvSpPr>
+        <p:spPr/>
+        <p:txBody>
+          <a:bodyPr/>
+          <a:lstStyle/>
+          <a:p>
+            <a:r>
+              <a:rPr lang="en-US" altLang="zh-CN" dirty="0"/>
+              <a:t>Case 2: Dynamic routing </a:t>
+            </a:r>
+            <a:endParaRPr lang="zh-CN" altLang="en-US" dirty="0"/>
+          </a:p>
+        </p:txBody>
+      </p:sp>
+      <p:sp>
+        <p:nvSpPr>
+          <p:cNvPr id="5" name="内容占位符 4">
+            <a:extLst>
+              <a:ext uri="{FF2B5EF4-FFF2-40B4-BE49-F238E27FC236}">
+                <a16:creationId xmlns:a16="http://schemas.microsoft.com/office/drawing/2014/main" id="{691D7C80-19FE-A52F-263F-DECA43DEFA71}"/>
+              </a:ext>
+            </a:extLst>
+          </p:cNvPr>
+          <p:cNvSpPr>
+            <a:spLocks noGrp="1"/>
+          </p:cNvSpPr>
+          <p:nvPr>
+            <p:ph idx="1"/>
+          </p:nvPr>
+        </p:nvSpPr>
+        <p:spPr/>
+        <p:txBody>
+          <a:bodyPr/>
+          <a:lstStyle/>
+          <a:p>
+            <a:r>
+              <a:rPr lang="en-US" altLang="zh-CN" dirty="0"/>
+              <a:t>New node discovery: turn on a new board -&gt; listens to channel 12 for 5 times -&gt; if no flooding message is received -&gt; send discovery signal to neighbor nodes -&gt; master initialize network reset </a:t>
+            </a:r>
+          </a:p>
+          <a:p>
+            <a:endParaRPr lang="en-US" altLang="zh-CN" dirty="0"/>
+          </a:p>
+          <a:p>
+            <a:endParaRPr lang="en-US" altLang="zh-CN" dirty="0"/>
+          </a:p>
+          <a:p>
+            <a:r>
+              <a:rPr lang="en-US" altLang="zh-CN" dirty="0"/>
+              <a:t>Existing node failure: turn off a working node -&gt; master does not receive its heartbeat signal -&gt; master initialize network reset </a:t>
+            </a:r>
+          </a:p>
+          <a:p>
+            <a:pPr marL="0" indent="0">
+              <a:buNone/>
+            </a:pPr>
+            <a:endParaRPr lang="zh-CN" altLang="en-US" dirty="0"/>
+          </a:p>
+        </p:txBody>
+      </p:sp>
+    </p:spTree>
+    <p:extLst>
+      <p:ext uri="{BB962C8B-B14F-4D97-AF65-F5344CB8AC3E}">
+        <p14:creationId xmlns:p14="http://schemas.microsoft.com/office/powerpoint/2010/main" val="1376155735"/>
+      </p:ext>
+    </p:extLst>
+  </p:cSld>
+  <p:clrMapOvr>
+    <a:masterClrMapping/>
+  </p:clrMapOvr>
+</p:sld>
+</file>
+
+<file path=ppt/slides/slide11.xml><?xml version="1.0" encoding="utf-8"?>
+<p:sld xmlns:a="http://schemas.openxmlformats.org/drawingml/2006/main" xmlns:r="http://schemas.openxmlformats.org/officeDocument/2006/relationships" xmlns:p="http://schemas.openxmlformats.org/presentationml/2006/main">
+  <p:cSld>
+    <p:spTree>
+      <p:nvGrpSpPr>
+        <p:cNvPr id="1" name="">
+          <a:extLst>
+            <a:ext uri="{FF2B5EF4-FFF2-40B4-BE49-F238E27FC236}">
+              <a16:creationId xmlns:a16="http://schemas.microsoft.com/office/drawing/2014/main" id="{7670DE80-71AA-BBC3-FF9D-4B97D0CFDC7D}"/>
+            </a:ext>
+          </a:extLst>
+        </p:cNvPr>
+        <p:cNvGrpSpPr/>
+        <p:nvPr/>
+      </p:nvGrpSpPr>
+      <p:grpSpPr>
+        <a:xfrm>
+          <a:off x="0" y="0"/>
+          <a:ext cx="0" cy="0"/>
+          <a:chOff x="0" y="0"/>
+          <a:chExt cx="0" cy="0"/>
+        </a:xfrm>
+      </p:grpSpPr>
+      <p:sp>
+        <p:nvSpPr>
+          <p:cNvPr id="4" name="标题 3">
+            <a:extLst>
+              <a:ext uri="{FF2B5EF4-FFF2-40B4-BE49-F238E27FC236}">
+                <a16:creationId xmlns:a16="http://schemas.microsoft.com/office/drawing/2014/main" id="{9DB51283-FE0C-A834-19B7-C2138A6A2CAF}"/>
+              </a:ext>
+            </a:extLst>
+          </p:cNvPr>
+          <p:cNvSpPr>
+            <a:spLocks noGrp="1"/>
+          </p:cNvSpPr>
+          <p:nvPr>
+            <p:ph type="title"/>
+          </p:nvPr>
+        </p:nvSpPr>
+        <p:spPr>
+          <a:xfrm>
+            <a:off x="838200" y="681649"/>
+            <a:ext cx="8575431" cy="1325563"/>
+          </a:xfrm>
+        </p:spPr>
+        <p:txBody>
+          <a:bodyPr/>
+          <a:lstStyle/>
+          <a:p>
+            <a:r>
+              <a:rPr lang="en-US" altLang="zh-CN" dirty="0"/>
+              <a:t>Case 3: Reactive network (application specific)</a:t>
+            </a:r>
+            <a:endParaRPr lang="zh-CN" altLang="en-US" dirty="0"/>
+          </a:p>
+        </p:txBody>
+      </p:sp>
+      <p:sp>
+        <p:nvSpPr>
+          <p:cNvPr id="5" name="内容占位符 4">
+            <a:extLst>
+              <a:ext uri="{FF2B5EF4-FFF2-40B4-BE49-F238E27FC236}">
+                <a16:creationId xmlns:a16="http://schemas.microsoft.com/office/drawing/2014/main" id="{7767E8BA-A499-793E-711B-4BE85D248262}"/>
+              </a:ext>
+            </a:extLst>
+          </p:cNvPr>
+          <p:cNvSpPr>
+            <a:spLocks noGrp="1"/>
+          </p:cNvSpPr>
+          <p:nvPr>
+            <p:ph idx="1"/>
+          </p:nvPr>
+        </p:nvSpPr>
+        <p:spPr>
+          <a:xfrm>
+            <a:off x="838200" y="2223598"/>
+            <a:ext cx="10515600" cy="4351338"/>
+          </a:xfrm>
+        </p:spPr>
+        <p:txBody>
+          <a:bodyPr/>
+          <a:lstStyle/>
+          <a:p>
+            <a:r>
+              <a:rPr lang="en-US" altLang="zh-CN" dirty="0"/>
+              <a:t>Sensor value will only be transmitted and displayed when it changes dramatically (change of light &gt; 50 lux or distance &gt; 10cm)</a:t>
+            </a:r>
+            <a:endParaRPr lang="zh-CN" altLang="en-US" dirty="0"/>
+          </a:p>
+        </p:txBody>
+      </p:sp>
+    </p:spTree>
+    <p:extLst>
+      <p:ext uri="{BB962C8B-B14F-4D97-AF65-F5344CB8AC3E}">
+        <p14:creationId xmlns:p14="http://schemas.microsoft.com/office/powerpoint/2010/main" val="3782980413"/>
+      </p:ext>
+    </p:extLst>
+  </p:cSld>
+  <p:clrMapOvr>
+    <a:masterClrMapping/>
+  </p:clrMapOvr>
+</p:sld>
+</file>
+
+<file path=ppt/slides/slide12.xml><?xml version="1.0" encoding="utf-8"?>
+<p:sld xmlns:a="http://schemas.openxmlformats.org/drawingml/2006/main" xmlns:r="http://schemas.openxmlformats.org/officeDocument/2006/relationships" xmlns:p="http://schemas.openxmlformats.org/presentationml/2006/main">
+  <p:cSld>
+    <p:spTree>
+      <p:nvGrpSpPr>
+        <p:cNvPr id="1" name="">
+          <a:extLst>
+            <a:ext uri="{FF2B5EF4-FFF2-40B4-BE49-F238E27FC236}">
+              <a16:creationId xmlns:a16="http://schemas.microsoft.com/office/drawing/2014/main" id="{7EB5FBD8-F322-A349-450B-E738F819F082}"/>
+            </a:ext>
+          </a:extLst>
+        </p:cNvPr>
+        <p:cNvGrpSpPr/>
+        <p:nvPr/>
+      </p:nvGrpSpPr>
+      <p:grpSpPr>
+        <a:xfrm>
+          <a:off x="0" y="0"/>
+          <a:ext cx="0" cy="0"/>
+          <a:chOff x="0" y="0"/>
+          <a:chExt cx="0" cy="0"/>
+        </a:xfrm>
+      </p:grpSpPr>
+      <p:sp>
+        <p:nvSpPr>
+          <p:cNvPr id="4" name="标题 3">
+            <a:extLst>
+              <a:ext uri="{FF2B5EF4-FFF2-40B4-BE49-F238E27FC236}">
+                <a16:creationId xmlns:a16="http://schemas.microsoft.com/office/drawing/2014/main" id="{40FEA80F-EC0D-2E34-C8B7-208901881140}"/>
+              </a:ext>
+            </a:extLst>
+          </p:cNvPr>
+          <p:cNvSpPr>
+            <a:spLocks noGrp="1"/>
+          </p:cNvSpPr>
+          <p:nvPr>
+            <p:ph type="title"/>
+          </p:nvPr>
+        </p:nvSpPr>
+        <p:spPr>
+          <a:xfrm>
+            <a:off x="838200" y="500062"/>
+            <a:ext cx="10515600" cy="1325563"/>
+          </a:xfrm>
+        </p:spPr>
+        <p:txBody>
+          <a:bodyPr/>
+          <a:lstStyle/>
+          <a:p>
+            <a:r>
+              <a:rPr lang="en-US" altLang="zh-CN" dirty="0"/>
+              <a:t>Case 4: Low-energy awareness routing</a:t>
+            </a:r>
+            <a:endParaRPr lang="zh-CN" altLang="en-US" dirty="0"/>
+          </a:p>
+        </p:txBody>
+      </p:sp>
+      <p:sp>
+        <p:nvSpPr>
+          <p:cNvPr id="5" name="内容占位符 4">
+            <a:extLst>
+              <a:ext uri="{FF2B5EF4-FFF2-40B4-BE49-F238E27FC236}">
+                <a16:creationId xmlns:a16="http://schemas.microsoft.com/office/drawing/2014/main" id="{1F9CBB7B-50DE-C537-68AD-ACCFF553EDAC}"/>
+              </a:ext>
+            </a:extLst>
+          </p:cNvPr>
+          <p:cNvSpPr>
+            <a:spLocks noGrp="1"/>
+          </p:cNvSpPr>
+          <p:nvPr>
+            <p:ph idx="1"/>
+          </p:nvPr>
+        </p:nvSpPr>
+        <p:spPr>
+          <a:xfrm>
+            <a:off x="838200" y="1925271"/>
+            <a:ext cx="10515600" cy="4351338"/>
+          </a:xfrm>
+        </p:spPr>
+        <p:txBody>
+          <a:bodyPr/>
+          <a:lstStyle/>
+          <a:p>
+            <a:endParaRPr lang="zh-CN" altLang="en-US" dirty="0"/>
+          </a:p>
+        </p:txBody>
+      </p:sp>
+    </p:spTree>
+    <p:extLst>
+      <p:ext uri="{BB962C8B-B14F-4D97-AF65-F5344CB8AC3E}">
+        <p14:creationId xmlns:p14="http://schemas.microsoft.com/office/powerpoint/2010/main" val="1859502817"/>
+      </p:ext>
+    </p:extLst>
+  </p:cSld>
+  <p:clrMapOvr>
+    <a:masterClrMapping/>
+  </p:clrMapOvr>
+</p:sld>
+</file>
+
+<file path=ppt/slides/slide13.xml><?xml version="1.0" encoding="utf-8"?>
+<p:sld xmlns:a="http://schemas.openxmlformats.org/drawingml/2006/main" xmlns:r="http://schemas.openxmlformats.org/officeDocument/2006/relationships" xmlns:p="http://schemas.openxmlformats.org/presentationml/2006/main">
+  <p:cSld>
+    <p:spTree>
+      <p:nvGrpSpPr>
+        <p:cNvPr id="1" name="">
+          <a:extLst>
+            <a:ext uri="{FF2B5EF4-FFF2-40B4-BE49-F238E27FC236}">
+              <a16:creationId xmlns:a16="http://schemas.microsoft.com/office/drawing/2014/main" id="{7EACB404-3DDD-D939-331F-E3B7B5911B4E}"/>
+            </a:ext>
+          </a:extLst>
+        </p:cNvPr>
+        <p:cNvGrpSpPr/>
+        <p:nvPr/>
+      </p:nvGrpSpPr>
+      <p:grpSpPr>
+        <a:xfrm>
+          <a:off x="0" y="0"/>
+          <a:ext cx="0" cy="0"/>
+          <a:chOff x="0" y="0"/>
+          <a:chExt cx="0" cy="0"/>
+        </a:xfrm>
+      </p:grpSpPr>
+      <p:pic>
+        <p:nvPicPr>
+          <p:cNvPr id="7" name="图片 6">
+            <a:extLst>
+              <a:ext uri="{FF2B5EF4-FFF2-40B4-BE49-F238E27FC236}">
+                <a16:creationId xmlns:a16="http://schemas.microsoft.com/office/drawing/2014/main" id="{A6E4AAD3-B446-4707-2039-79D559C6C2E9}"/>
+              </a:ext>
+            </a:extLst>
+          </p:cNvPr>
+          <p:cNvPicPr>
+            <a:picLocks noChangeAspect="1"/>
+          </p:cNvPicPr>
+          <p:nvPr/>
+        </p:nvPicPr>
+        <p:blipFill>
+          <a:blip r:embed="rId2"/>
+          <a:stretch>
+            <a:fillRect/>
+          </a:stretch>
+        </p:blipFill>
+        <p:spPr>
+          <a:xfrm>
+            <a:off x="10214811" y="192089"/>
+            <a:ext cx="1270905" cy="659432"/>
+          </a:xfrm>
+          <a:prstGeom prst="rect">
+            <a:avLst/>
+          </a:prstGeom>
+        </p:spPr>
+      </p:pic>
+      <p:sp>
+        <p:nvSpPr>
+          <p:cNvPr id="2" name="矩形 1">
+            <a:extLst>
+              <a:ext uri="{FF2B5EF4-FFF2-40B4-BE49-F238E27FC236}">
+                <a16:creationId xmlns:a16="http://schemas.microsoft.com/office/drawing/2014/main" id="{ACD7414B-B3FA-A7F1-E91E-7720D1CA6F0A}"/>
+              </a:ext>
+            </a:extLst>
+          </p:cNvPr>
+          <p:cNvSpPr/>
+          <p:nvPr/>
+        </p:nvSpPr>
+        <p:spPr>
+          <a:xfrm>
+            <a:off x="2132096" y="2129135"/>
+            <a:ext cx="7927811" cy="1754326"/>
+          </a:xfrm>
+          <a:prstGeom prst="rect">
+            <a:avLst/>
+          </a:prstGeom>
+          <a:noFill/>
+        </p:spPr>
+        <p:txBody>
+          <a:bodyPr wrap="none" lIns="91440" tIns="45720" rIns="91440" bIns="45720">
+            <a:spAutoFit/>
+          </a:bodyPr>
+          <a:lstStyle/>
+          <a:p>
+            <a:pPr algn="ctr"/>
+            <a:r>
+              <a:rPr lang="en-US" altLang="zh-CN" sz="5400" b="0" cap="none" spc="0" dirty="0">
+                <a:ln w="0"/>
+                <a:solidFill>
+                  <a:schemeClr val="tx1"/>
+                </a:solidFill>
+                <a:effectLst>
+                  <a:outerShdw blurRad="38100" dist="19050" dir="2700000" algn="tl" rotWithShape="0">
+                    <a:schemeClr val="dk1">
+                      <a:alpha val="40000"/>
+                    </a:schemeClr>
+                  </a:outerShdw>
+                </a:effectLst>
+              </a:rPr>
+              <a:t>Thanks for Listening</a:t>
+            </a:r>
+          </a:p>
+          <a:p>
+            <a:pPr algn="ctr"/>
+            <a:r>
+              <a:rPr lang="en-US" altLang="zh-CN" sz="5400" b="0" cap="none" spc="0" dirty="0">
+                <a:ln w="0"/>
+                <a:solidFill>
+                  <a:schemeClr val="tx1"/>
+                </a:solidFill>
+                <a:effectLst>
+                  <a:outerShdw blurRad="38100" dist="19050" dir="2700000" algn="tl" rotWithShape="0">
+                    <a:schemeClr val="dk1">
+                      <a:alpha val="40000"/>
+                    </a:schemeClr>
+                  </a:outerShdw>
+                </a:effectLst>
+              </a:rPr>
+              <a:t>Any questions or feedback?</a:t>
+            </a:r>
+            <a:endParaRPr lang="zh-CN" altLang="en-US" sz="5400" b="0" cap="none" spc="0" dirty="0">
+              <a:ln w="0"/>
+              <a:solidFill>
+                <a:schemeClr val="tx1"/>
+              </a:solidFill>
+              <a:effectLst>
+                <a:outerShdw blurRad="38100" dist="19050" dir="2700000" algn="tl" rotWithShape="0">
+                  <a:schemeClr val="dk1">
+                    <a:alpha val="40000"/>
+                  </a:schemeClr>
+                </a:outerShdw>
+              </a:effectLst>
+            </a:endParaRPr>
+          </a:p>
+        </p:txBody>
+      </p:sp>
+    </p:spTree>
+    <p:extLst>
+      <p:ext uri="{BB962C8B-B14F-4D97-AF65-F5344CB8AC3E}">
+        <p14:creationId xmlns:p14="http://schemas.microsoft.com/office/powerpoint/2010/main" val="374094616"/>
+      </p:ext>
+    </p:extLst>
+  </p:cSld>
+  <p:clrMapOvr>
+    <a:masterClrMapping/>
+  </p:clrMapOvr>
+</p:sld>
+</file>
+
 <file path=ppt/slides/slide2.xml><?xml version="1.0" encoding="utf-8"?>
 <p:sld xmlns:a="http://schemas.openxmlformats.org/drawingml/2006/main" xmlns:r="http://schemas.openxmlformats.org/officeDocument/2006/relationships" xmlns:p="http://schemas.openxmlformats.org/presentationml/2006/main">
   <p:cSld>
@@ -8242,7 +8799,7 @@
             </a:pPr>
             <a:r>
               <a:rPr lang="en-US" altLang="zh-CN" sz="2000" dirty="0"/>
-              <a:t>Integrate multiple sensor types for reliable detection and fault tolerance</a:t>
+              <a:t>Integrate two sensor types for reliable detection and fault tolerance</a:t>
             </a:r>
             <a:endParaRPr lang="en-US" altLang="zh-CN" sz="1900" dirty="0"/>
           </a:p>
@@ -8328,8 +8885,8 @@
         </p:nvSpPr>
         <p:spPr>
           <a:xfrm>
-            <a:off x="404178" y="521805"/>
-            <a:ext cx="3879653" cy="553998"/>
+            <a:off x="486772" y="738682"/>
+            <a:ext cx="5609228" cy="769441"/>
           </a:xfrm>
           <a:prstGeom prst="rect">
             <a:avLst/>
@@ -8344,7 +8901,7 @@
           <a:p>
             <a:pPr algn="ctr"/>
             <a:r>
-              <a:rPr lang="en-US" altLang="zh-CN" sz="3000" b="0" cap="none" spc="0" dirty="0">
+              <a:rPr lang="en-US" altLang="zh-CN" sz="4400" b="0" cap="none" spc="0" dirty="0">
                 <a:ln w="0"/>
                 <a:solidFill>
                   <a:schemeClr val="tx1"/>
@@ -8359,7 +8916,7 @@
               </a:rPr>
               <a:t>Hardware and Software</a:t>
             </a:r>
-            <a:endParaRPr lang="zh-CN" altLang="en-US" sz="3000" b="0" cap="none" spc="0" dirty="0">
+            <a:endParaRPr lang="zh-CN" altLang="en-US" sz="4400" b="0" cap="none" spc="0" dirty="0">
               <a:ln w="0"/>
               <a:solidFill>
                 <a:schemeClr val="tx1"/>
@@ -8389,7 +8946,7 @@
         </p:nvSpPr>
         <p:spPr>
           <a:xfrm>
-            <a:off x="312820" y="1215189"/>
+            <a:off x="486772" y="1660666"/>
             <a:ext cx="5919304" cy="4093428"/>
           </a:xfrm>
           <a:prstGeom prst="rect">
@@ -8513,7 +9070,7 @@
         </p:nvSpPr>
         <p:spPr>
           <a:xfrm>
-            <a:off x="6670235" y="1215189"/>
+            <a:off x="6611620" y="1660666"/>
             <a:ext cx="4570856" cy="3200876"/>
           </a:xfrm>
           <a:prstGeom prst="rect">
@@ -8655,7 +9212,7 @@
           <p:cNvPr id="2" name="标题 1">
             <a:extLst>
               <a:ext uri="{FF2B5EF4-FFF2-40B4-BE49-F238E27FC236}">
-                <a16:creationId xmlns:a16="http://schemas.microsoft.com/office/drawing/2014/main" id="{1F49A434-85AD-5400-39C8-687CCA487C63}"/>
+                <a16:creationId xmlns:a16="http://schemas.microsoft.com/office/drawing/2014/main" id="{EFAC2EC8-D9C9-39FC-47D1-7F6F29CBBE72}"/>
               </a:ext>
             </a:extLst>
           </p:cNvPr>
@@ -8666,14 +9223,19 @@
             <p:ph type="title"/>
           </p:nvPr>
         </p:nvSpPr>
-        <p:spPr/>
+        <p:spPr>
+          <a:xfrm>
+            <a:off x="779585" y="695447"/>
+            <a:ext cx="7221415" cy="1325563"/>
+          </a:xfrm>
+        </p:spPr>
         <p:txBody>
           <a:bodyPr/>
           <a:lstStyle/>
           <a:p>
             <a:r>
               <a:rPr lang="en-US" altLang="zh-CN" dirty="0"/>
-              <a:t>Demonstration </a:t>
+              <a:t>Network description and routing technique</a:t>
             </a:r>
             <a:endParaRPr lang="zh-CN" altLang="en-US" dirty="0"/>
           </a:p>
@@ -8681,10 +9243,10 @@
       </p:sp>
       <p:sp>
         <p:nvSpPr>
-          <p:cNvPr id="4" name="文本占位符 3">
+          <p:cNvPr id="3" name="内容占位符 2">
             <a:extLst>
               <a:ext uri="{FF2B5EF4-FFF2-40B4-BE49-F238E27FC236}">
-                <a16:creationId xmlns:a16="http://schemas.microsoft.com/office/drawing/2014/main" id="{50427620-1FCF-C79D-E372-8620C8806ECE}"/>
+                <a16:creationId xmlns:a16="http://schemas.microsoft.com/office/drawing/2014/main" id="{B078B511-E91A-BD80-3B1D-4C06E63F67A1}"/>
               </a:ext>
             </a:extLst>
           </p:cNvPr>
@@ -8692,22 +9254,27 @@
             <a:spLocks noGrp="1"/>
           </p:cNvSpPr>
           <p:nvPr>
-            <p:ph type="body" idx="1"/>
-          </p:nvPr>
-        </p:nvSpPr>
-        <p:spPr/>
-        <p:txBody>
-          <a:bodyPr/>
-          <a:lstStyle/>
-          <a:p>
-            <a:endParaRPr lang="zh-CN" altLang="en-US"/>
+            <p:ph idx="1"/>
+          </p:nvPr>
+        </p:nvSpPr>
+        <p:spPr>
+          <a:xfrm>
+            <a:off x="779585" y="2161687"/>
+            <a:ext cx="10515600" cy="4351338"/>
+          </a:xfrm>
+        </p:spPr>
+        <p:txBody>
+          <a:bodyPr/>
+          <a:lstStyle/>
+          <a:p>
+            <a:endParaRPr lang="zh-CN" altLang="en-US" dirty="0"/>
           </a:p>
         </p:txBody>
       </p:sp>
     </p:spTree>
     <p:extLst>
       <p:ext uri="{BB962C8B-B14F-4D97-AF65-F5344CB8AC3E}">
-        <p14:creationId xmlns:p14="http://schemas.microsoft.com/office/powerpoint/2010/main" val="3517742803"/>
+        <p14:creationId xmlns:p14="http://schemas.microsoft.com/office/powerpoint/2010/main" val="3818312586"/>
       </p:ext>
     </p:extLst>
   </p:cSld>
@@ -8718,6 +9285,276 @@
 </file>
 
 <file path=ppt/slides/slide5.xml><?xml version="1.0" encoding="utf-8"?>
+<p:sld xmlns:a="http://schemas.openxmlformats.org/drawingml/2006/main" xmlns:r="http://schemas.openxmlformats.org/officeDocument/2006/relationships" xmlns:p="http://schemas.openxmlformats.org/presentationml/2006/main">
+  <p:cSld>
+    <p:spTree>
+      <p:nvGrpSpPr>
+        <p:cNvPr id="1" name="">
+          <a:extLst>
+            <a:ext uri="{FF2B5EF4-FFF2-40B4-BE49-F238E27FC236}">
+              <a16:creationId xmlns:a16="http://schemas.microsoft.com/office/drawing/2014/main" id="{D20CA2CF-8A0F-F9FC-2600-3FAD2BE14107}"/>
+            </a:ext>
+          </a:extLst>
+        </p:cNvPr>
+        <p:cNvGrpSpPr/>
+        <p:nvPr/>
+      </p:nvGrpSpPr>
+      <p:grpSpPr>
+        <a:xfrm>
+          <a:off x="0" y="0"/>
+          <a:ext cx="0" cy="0"/>
+          <a:chOff x="0" y="0"/>
+          <a:chExt cx="0" cy="0"/>
+        </a:xfrm>
+      </p:grpSpPr>
+      <p:sp>
+        <p:nvSpPr>
+          <p:cNvPr id="2" name="标题 1">
+            <a:extLst>
+              <a:ext uri="{FF2B5EF4-FFF2-40B4-BE49-F238E27FC236}">
+                <a16:creationId xmlns:a16="http://schemas.microsoft.com/office/drawing/2014/main" id="{6D191B2C-9F6B-2179-B9EE-072612284E30}"/>
+              </a:ext>
+            </a:extLst>
+          </p:cNvPr>
+          <p:cNvSpPr>
+            <a:spLocks noGrp="1"/>
+          </p:cNvSpPr>
+          <p:nvPr>
+            <p:ph type="title"/>
+          </p:nvPr>
+        </p:nvSpPr>
+        <p:spPr>
+          <a:xfrm>
+            <a:off x="838200" y="500062"/>
+            <a:ext cx="7221415" cy="1325563"/>
+          </a:xfrm>
+        </p:spPr>
+        <p:txBody>
+          <a:bodyPr/>
+          <a:lstStyle/>
+          <a:p>
+            <a:r>
+              <a:rPr lang="en-US" altLang="zh-CN" dirty="0"/>
+              <a:t>Graphical user interface (GUI)</a:t>
+            </a:r>
+            <a:endParaRPr lang="zh-CN" altLang="en-US" dirty="0"/>
+          </a:p>
+        </p:txBody>
+      </p:sp>
+      <p:pic>
+        <p:nvPicPr>
+          <p:cNvPr id="5" name="内容占位符 4">
+            <a:extLst>
+              <a:ext uri="{FF2B5EF4-FFF2-40B4-BE49-F238E27FC236}">
+                <a16:creationId xmlns:a16="http://schemas.microsoft.com/office/drawing/2014/main" id="{6B8B60E6-707F-8DF7-9D06-5DCD5C0ED19E}"/>
+              </a:ext>
+            </a:extLst>
+          </p:cNvPr>
+          <p:cNvPicPr>
+            <a:picLocks noGrp="1" noChangeAspect="1"/>
+          </p:cNvPicPr>
+          <p:nvPr>
+            <p:ph idx="1"/>
+          </p:nvPr>
+        </p:nvPicPr>
+        <p:blipFill>
+          <a:blip r:embed="rId2">
+            <a:extLst>
+              <a:ext uri="{28A0092B-C50C-407E-A947-70E740481C1C}">
+                <a14:useLocalDpi xmlns:a14="http://schemas.microsoft.com/office/drawing/2010/main" val="0"/>
+              </a:ext>
+            </a:extLst>
+          </a:blip>
+          <a:stretch>
+            <a:fillRect/>
+          </a:stretch>
+        </p:blipFill>
+        <p:spPr>
+          <a:xfrm>
+            <a:off x="903892" y="1781908"/>
+            <a:ext cx="4859765" cy="4467225"/>
+          </a:xfrm>
+        </p:spPr>
+      </p:pic>
+    </p:spTree>
+    <p:extLst>
+      <p:ext uri="{BB962C8B-B14F-4D97-AF65-F5344CB8AC3E}">
+        <p14:creationId xmlns:p14="http://schemas.microsoft.com/office/powerpoint/2010/main" val="2478395493"/>
+      </p:ext>
+    </p:extLst>
+  </p:cSld>
+  <p:clrMapOvr>
+    <a:masterClrMapping/>
+  </p:clrMapOvr>
+</p:sld>
+</file>
+
+<file path=ppt/slides/slide6.xml><?xml version="1.0" encoding="utf-8"?>
+<p:sld xmlns:a="http://schemas.openxmlformats.org/drawingml/2006/main" xmlns:r="http://schemas.openxmlformats.org/officeDocument/2006/relationships" xmlns:p="http://schemas.openxmlformats.org/presentationml/2006/main">
+  <p:cSld>
+    <p:spTree>
+      <p:nvGrpSpPr>
+        <p:cNvPr id="1" name="">
+          <a:extLst>
+            <a:ext uri="{FF2B5EF4-FFF2-40B4-BE49-F238E27FC236}">
+              <a16:creationId xmlns:a16="http://schemas.microsoft.com/office/drawing/2014/main" id="{15AD8457-F0ED-21AB-9F62-2D66C1EEA74F}"/>
+            </a:ext>
+          </a:extLst>
+        </p:cNvPr>
+        <p:cNvGrpSpPr/>
+        <p:nvPr/>
+      </p:nvGrpSpPr>
+      <p:grpSpPr>
+        <a:xfrm>
+          <a:off x="0" y="0"/>
+          <a:ext cx="0" cy="0"/>
+          <a:chOff x="0" y="0"/>
+          <a:chExt cx="0" cy="0"/>
+        </a:xfrm>
+      </p:grpSpPr>
+      <p:sp>
+        <p:nvSpPr>
+          <p:cNvPr id="2" name="标题 1">
+            <a:extLst>
+              <a:ext uri="{FF2B5EF4-FFF2-40B4-BE49-F238E27FC236}">
+                <a16:creationId xmlns:a16="http://schemas.microsoft.com/office/drawing/2014/main" id="{3F0DBCD4-BB28-86FE-1005-0315B29CEF0F}"/>
+              </a:ext>
+            </a:extLst>
+          </p:cNvPr>
+          <p:cNvSpPr>
+            <a:spLocks noGrp="1"/>
+          </p:cNvSpPr>
+          <p:nvPr>
+            <p:ph type="title"/>
+          </p:nvPr>
+        </p:nvSpPr>
+        <p:spPr>
+          <a:xfrm>
+            <a:off x="838200" y="500062"/>
+            <a:ext cx="7221415" cy="1325563"/>
+          </a:xfrm>
+        </p:spPr>
+        <p:txBody>
+          <a:bodyPr/>
+          <a:lstStyle/>
+          <a:p>
+            <a:r>
+              <a:rPr lang="en-US" altLang="zh-CN" dirty="0"/>
+              <a:t>Graphical user interface (GUI)</a:t>
+            </a:r>
+            <a:endParaRPr lang="zh-CN" altLang="en-US" dirty="0"/>
+          </a:p>
+        </p:txBody>
+      </p:sp>
+      <p:pic>
+        <p:nvPicPr>
+          <p:cNvPr id="7" name="图片 6">
+            <a:extLst>
+              <a:ext uri="{FF2B5EF4-FFF2-40B4-BE49-F238E27FC236}">
+                <a16:creationId xmlns:a16="http://schemas.microsoft.com/office/drawing/2014/main" id="{2E8CF387-5894-D1A9-0EBD-DBD57320352C}"/>
+              </a:ext>
+            </a:extLst>
+          </p:cNvPr>
+          <p:cNvPicPr>
+            <a:picLocks noChangeAspect="1"/>
+          </p:cNvPicPr>
+          <p:nvPr/>
+        </p:nvPicPr>
+        <p:blipFill>
+          <a:blip r:embed="rId2">
+            <a:extLst>
+              <a:ext uri="{28A0092B-C50C-407E-A947-70E740481C1C}">
+                <a14:useLocalDpi xmlns:a14="http://schemas.microsoft.com/office/drawing/2010/main" val="0"/>
+              </a:ext>
+            </a:extLst>
+          </a:blip>
+          <a:stretch>
+            <a:fillRect/>
+          </a:stretch>
+        </p:blipFill>
+        <p:spPr>
+          <a:xfrm>
+            <a:off x="599708" y="1901031"/>
+            <a:ext cx="5400675" cy="4200525"/>
+          </a:xfrm>
+          <a:prstGeom prst="rect">
+            <a:avLst/>
+          </a:prstGeom>
+        </p:spPr>
+      </p:pic>
+      <p:sp>
+        <p:nvSpPr>
+          <p:cNvPr id="4" name="内容占位符 3">
+            <a:extLst>
+              <a:ext uri="{FF2B5EF4-FFF2-40B4-BE49-F238E27FC236}">
+                <a16:creationId xmlns:a16="http://schemas.microsoft.com/office/drawing/2014/main" id="{87CD6408-0B9C-5C5E-824A-0CA6637E2DFB}"/>
+              </a:ext>
+            </a:extLst>
+          </p:cNvPr>
+          <p:cNvSpPr>
+            <a:spLocks noGrp="1"/>
+          </p:cNvSpPr>
+          <p:nvPr>
+            <p:ph idx="1"/>
+          </p:nvPr>
+        </p:nvSpPr>
+        <p:spPr>
+          <a:xfrm>
+            <a:off x="6570784" y="1825625"/>
+            <a:ext cx="4964724" cy="4351338"/>
+          </a:xfrm>
+        </p:spPr>
+        <p:txBody>
+          <a:bodyPr/>
+          <a:lstStyle/>
+          <a:p>
+            <a:r>
+              <a:rPr lang="en-US" altLang="zh-CN" dirty="0"/>
+              <a:t>Right-hand-side of the GUI:</a:t>
+            </a:r>
+          </a:p>
+          <a:p>
+            <a:pPr marL="0" indent="0">
+              <a:buNone/>
+            </a:pPr>
+            <a:r>
+              <a:rPr lang="en-US" altLang="zh-CN" dirty="0"/>
+              <a:t>displays topology + network changes</a:t>
+            </a:r>
+          </a:p>
+          <a:p>
+            <a:pPr marL="0" indent="0">
+              <a:buNone/>
+            </a:pPr>
+            <a:endParaRPr lang="en-US" altLang="zh-CN" dirty="0"/>
+          </a:p>
+          <a:p>
+            <a:r>
+              <a:rPr lang="en-US" altLang="zh-CN" dirty="0"/>
+              <a:t>Use different color to mark different nodes (4 types </a:t>
+            </a:r>
+            <a:r>
+              <a:rPr lang="en-US" altLang="zh-CN"/>
+              <a:t>in total)</a:t>
+            </a:r>
+            <a:endParaRPr lang="zh-CN" altLang="en-US" dirty="0"/>
+          </a:p>
+        </p:txBody>
+      </p:sp>
+    </p:spTree>
+    <p:extLst>
+      <p:ext uri="{BB962C8B-B14F-4D97-AF65-F5344CB8AC3E}">
+        <p14:creationId xmlns:p14="http://schemas.microsoft.com/office/powerpoint/2010/main" val="3879945958"/>
+      </p:ext>
+    </p:extLst>
+  </p:cSld>
+  <p:clrMapOvr>
+    <a:masterClrMapping/>
+  </p:clrMapOvr>
+</p:sld>
+</file>
+
+<file path=ppt/slides/slide7.xml><?xml version="1.0" encoding="utf-8"?>
 <p:sld xmlns:a="http://schemas.openxmlformats.org/drawingml/2006/main" xmlns:r="http://schemas.openxmlformats.org/officeDocument/2006/relationships" xmlns:p="http://schemas.openxmlformats.org/presentationml/2006/main">
   <p:cSld>
     <p:spTree>
@@ -8736,10 +9573,10 @@
       </p:grpSpPr>
       <p:sp>
         <p:nvSpPr>
-          <p:cNvPr id="4" name="标题 3">
+          <p:cNvPr id="2" name="标题 1">
             <a:extLst>
               <a:ext uri="{FF2B5EF4-FFF2-40B4-BE49-F238E27FC236}">
-                <a16:creationId xmlns:a16="http://schemas.microsoft.com/office/drawing/2014/main" id="{CBBC0695-91F6-A944-9E3A-0F0E3BD75B70}"/>
+                <a16:creationId xmlns:a16="http://schemas.microsoft.com/office/drawing/2014/main" id="{8D3B5524-4C1F-6AAE-3281-FF904831A7D3}"/>
               </a:ext>
             </a:extLst>
           </p:cNvPr>
@@ -8757,7 +9594,7 @@
           <a:p>
             <a:r>
               <a:rPr lang="en-US" altLang="zh-CN" dirty="0"/>
-              <a:t>Case 1: Build up network</a:t>
+              <a:t>Application-specific features </a:t>
             </a:r>
             <a:endParaRPr lang="zh-CN" altLang="en-US" dirty="0"/>
           </a:p>
@@ -8765,10 +9602,10 @@
       </p:sp>
       <p:sp>
         <p:nvSpPr>
-          <p:cNvPr id="5" name="内容占位符 4">
+          <p:cNvPr id="3" name="内容占位符 2">
             <a:extLst>
               <a:ext uri="{FF2B5EF4-FFF2-40B4-BE49-F238E27FC236}">
-                <a16:creationId xmlns:a16="http://schemas.microsoft.com/office/drawing/2014/main" id="{720FBC12-0A06-BD07-EE46-3FD3602535A1}"/>
+                <a16:creationId xmlns:a16="http://schemas.microsoft.com/office/drawing/2014/main" id="{B0C141C0-1A9B-0B80-9BF4-5CC8B76810DD}"/>
               </a:ext>
             </a:extLst>
           </p:cNvPr>
@@ -8784,14 +9621,30 @@
           <a:bodyPr/>
           <a:lstStyle/>
           <a:p>
-            <a:endParaRPr lang="zh-CN" altLang="en-US"/>
+            <a:pPr marL="514350" indent="-514350">
+              <a:buAutoNum type="arabicPeriod"/>
+            </a:pPr>
+            <a:r>
+              <a:rPr lang="en-US" altLang="zh-CN" dirty="0"/>
+              <a:t>Routing Protocol  </a:t>
+            </a:r>
+          </a:p>
+          <a:p>
+            <a:pPr marL="514350" indent="-514350">
+              <a:buAutoNum type="arabicPeriod"/>
+            </a:pPr>
+            <a:r>
+              <a:rPr lang="en-US" altLang="zh-CN" dirty="0"/>
+              <a:t>Value filter system in network and GUI</a:t>
+            </a:r>
+            <a:endParaRPr lang="zh-CN" altLang="en-US" dirty="0"/>
           </a:p>
         </p:txBody>
       </p:sp>
     </p:spTree>
     <p:extLst>
       <p:ext uri="{BB962C8B-B14F-4D97-AF65-F5344CB8AC3E}">
-        <p14:creationId xmlns:p14="http://schemas.microsoft.com/office/powerpoint/2010/main" val="835081325"/>
+        <p14:creationId xmlns:p14="http://schemas.microsoft.com/office/powerpoint/2010/main" val="2957170577"/>
       </p:ext>
     </p:extLst>
   </p:cSld>
@@ -8801,7 +9654,7 @@
 </p:sld>
 </file>
 
-<file path=ppt/slides/slide6.xml><?xml version="1.0" encoding="utf-8"?>
+<file path=ppt/slides/slide8.xml><?xml version="1.0" encoding="utf-8"?>
 <p:sld xmlns:a="http://schemas.openxmlformats.org/drawingml/2006/main" xmlns:r="http://schemas.openxmlformats.org/officeDocument/2006/relationships" xmlns:p="http://schemas.openxmlformats.org/presentationml/2006/main">
   <p:cSld>
     <p:spTree>
@@ -8818,110 +9671,66 @@
           <a:chExt cx="0" cy="0"/>
         </a:xfrm>
       </p:grpSpPr>
-      <p:pic>
-        <p:nvPicPr>
-          <p:cNvPr id="7" name="图片 6"/>
-          <p:cNvPicPr>
-            <a:picLocks noChangeAspect="1"/>
-          </p:cNvPicPr>
-          <p:nvPr/>
-        </p:nvPicPr>
-        <p:blipFill>
-          <a:blip r:embed="rId2"/>
-          <a:stretch>
-            <a:fillRect/>
-          </a:stretch>
-        </p:blipFill>
-        <p:spPr>
-          <a:xfrm>
-            <a:off x="10214811" y="192089"/>
-            <a:ext cx="1270905" cy="659432"/>
-          </a:xfrm>
-          <a:prstGeom prst="rect">
-            <a:avLst/>
-          </a:prstGeom>
-        </p:spPr>
-      </p:pic>
-      <p:sp>
-        <p:nvSpPr>
-          <p:cNvPr id="2" name="矩形 1"/>
-          <p:cNvSpPr/>
-          <p:nvPr/>
-        </p:nvSpPr>
-        <p:spPr>
-          <a:xfrm>
-            <a:off x="252965" y="244806"/>
-            <a:ext cx="1906291" cy="553998"/>
-          </a:xfrm>
-          <a:prstGeom prst="rect">
-            <a:avLst/>
-          </a:prstGeom>
-          <a:noFill/>
-        </p:spPr>
-        <p:txBody>
-          <a:bodyPr wrap="none" lIns="91440" tIns="45720" rIns="91440" bIns="45720">
-            <a:spAutoFit/>
-          </a:bodyPr>
-          <a:lstStyle/>
-          <a:p>
-            <a:pPr algn="ctr"/>
-            <a:r>
-              <a:rPr lang="en-US" altLang="zh-CN" sz="3000" b="0" cap="none" spc="0" dirty="0">
-                <a:ln w="0"/>
-                <a:solidFill>
-                  <a:schemeClr val="tx1"/>
-                </a:solidFill>
-                <a:effectLst>
-                  <a:outerShdw blurRad="38100" dist="19050" dir="2700000" algn="tl" rotWithShape="0">
-                    <a:schemeClr val="dk1">
-                      <a:alpha val="40000"/>
-                    </a:schemeClr>
-                  </a:outerShdw>
-                </a:effectLst>
-              </a:rPr>
-              <a:t>GUI Design</a:t>
-            </a:r>
-            <a:endParaRPr lang="zh-CN" altLang="en-US" sz="3000" b="0" cap="none" spc="0" dirty="0">
-              <a:ln w="0"/>
-              <a:solidFill>
-                <a:schemeClr val="tx1"/>
-              </a:solidFill>
-              <a:effectLst>
-                <a:outerShdw blurRad="38100" dist="19050" dir="2700000" algn="tl" rotWithShape="0">
-                  <a:schemeClr val="dk1">
-                    <a:alpha val="40000"/>
-                  </a:schemeClr>
-                </a:outerShdw>
-              </a:effectLst>
-            </a:endParaRPr>
-          </a:p>
-        </p:txBody>
-      </p:sp>
-      <p:pic>
-        <p:nvPicPr>
-          <p:cNvPr id="8" name="图片 7" descr="gui1"/>
-          <p:cNvPicPr>
-            <a:picLocks noChangeAspect="1"/>
-          </p:cNvPicPr>
-          <p:nvPr/>
-        </p:nvPicPr>
-        <p:blipFill>
-          <a:blip r:embed="rId3"/>
-          <a:stretch>
-            <a:fillRect/>
-          </a:stretch>
-        </p:blipFill>
-        <p:spPr>
-          <a:xfrm>
-            <a:off x="-80645" y="999490"/>
-            <a:ext cx="6367145" cy="3702050"/>
-          </a:xfrm>
-          <a:prstGeom prst="rect">
-            <a:avLst/>
-          </a:prstGeom>
-        </p:spPr>
-      </p:pic>
+      <p:sp>
+        <p:nvSpPr>
+          <p:cNvPr id="2" name="标题 1">
+            <a:extLst>
+              <a:ext uri="{FF2B5EF4-FFF2-40B4-BE49-F238E27FC236}">
+                <a16:creationId xmlns:a16="http://schemas.microsoft.com/office/drawing/2014/main" id="{1F49A434-85AD-5400-39C8-687CCA487C63}"/>
+              </a:ext>
+            </a:extLst>
+          </p:cNvPr>
+          <p:cNvSpPr>
+            <a:spLocks noGrp="1"/>
+          </p:cNvSpPr>
+          <p:nvPr>
+            <p:ph type="title"/>
+          </p:nvPr>
+        </p:nvSpPr>
+        <p:spPr/>
+        <p:txBody>
+          <a:bodyPr/>
+          <a:lstStyle/>
+          <a:p>
+            <a:r>
+              <a:rPr lang="en-US" altLang="zh-CN" dirty="0"/>
+              <a:t>Demonstration cases  </a:t>
+            </a:r>
+            <a:endParaRPr lang="zh-CN" altLang="en-US" dirty="0"/>
+          </a:p>
+        </p:txBody>
+      </p:sp>
+      <p:sp>
+        <p:nvSpPr>
+          <p:cNvPr id="4" name="文本占位符 3">
+            <a:extLst>
+              <a:ext uri="{FF2B5EF4-FFF2-40B4-BE49-F238E27FC236}">
+                <a16:creationId xmlns:a16="http://schemas.microsoft.com/office/drawing/2014/main" id="{50427620-1FCF-C79D-E372-8620C8806ECE}"/>
+              </a:ext>
+            </a:extLst>
+          </p:cNvPr>
+          <p:cNvSpPr>
+            <a:spLocks noGrp="1"/>
+          </p:cNvSpPr>
+          <p:nvPr>
+            <p:ph type="body" idx="1"/>
+          </p:nvPr>
+        </p:nvSpPr>
+        <p:spPr/>
+        <p:txBody>
+          <a:bodyPr/>
+          <a:lstStyle/>
+          <a:p>
+            <a:endParaRPr lang="zh-CN" altLang="en-US"/>
+          </a:p>
+        </p:txBody>
+      </p:sp>
     </p:spTree>
+    <p:extLst>
+      <p:ext uri="{BB962C8B-B14F-4D97-AF65-F5344CB8AC3E}">
+        <p14:creationId xmlns:p14="http://schemas.microsoft.com/office/powerpoint/2010/main" val="3517742803"/>
+      </p:ext>
+    </p:extLst>
   </p:cSld>
   <p:clrMapOvr>
     <a:masterClrMapping/>
@@ -8929,18 +9738,12 @@
 </p:sld>
 </file>
 
-<file path=ppt/slides/slide7.xml><?xml version="1.0" encoding="utf-8"?>
+<file path=ppt/slides/slide9.xml><?xml version="1.0" encoding="utf-8"?>
 <p:sld xmlns:a="http://schemas.openxmlformats.org/drawingml/2006/main" xmlns:r="http://schemas.openxmlformats.org/officeDocument/2006/relationships" xmlns:p="http://schemas.openxmlformats.org/presentationml/2006/main">
   <p:cSld>
     <p:spTree>
       <p:nvGrpSpPr>
-        <p:cNvPr id="1" name="">
-          <a:extLst>
-            <a:ext uri="{FF2B5EF4-FFF2-40B4-BE49-F238E27FC236}">
-              <a16:creationId xmlns:a16="http://schemas.microsoft.com/office/drawing/2014/main" id="{7EACB404-3DDD-D939-331F-E3B7B5911B4E}"/>
-            </a:ext>
-          </a:extLst>
-        </p:cNvPr>
+        <p:cNvPr id="1" name=""/>
         <p:cNvGrpSpPr/>
         <p:nvPr/>
       </p:nvGrpSpPr>
@@ -8952,120 +9755,117 @@
           <a:chExt cx="0" cy="0"/>
         </a:xfrm>
       </p:grpSpPr>
-      <p:pic>
-        <p:nvPicPr>
-          <p:cNvPr id="7" name="图片 6">
+      <p:sp>
+        <p:nvSpPr>
+          <p:cNvPr id="4" name="标题 3">
             <a:extLst>
               <a:ext uri="{FF2B5EF4-FFF2-40B4-BE49-F238E27FC236}">
-                <a16:creationId xmlns:a16="http://schemas.microsoft.com/office/drawing/2014/main" id="{A6E4AAD3-B446-4707-2039-79D559C6C2E9}"/>
+                <a16:creationId xmlns:a16="http://schemas.microsoft.com/office/drawing/2014/main" id="{CBBC0695-91F6-A944-9E3A-0F0E3BD75B70}"/>
               </a:ext>
             </a:extLst>
           </p:cNvPr>
-          <p:cNvPicPr>
-            <a:picLocks noChangeAspect="1"/>
-          </p:cNvPicPr>
-          <p:nvPr/>
-        </p:nvPicPr>
-        <p:blipFill>
-          <a:blip r:embed="rId2"/>
-          <a:stretch>
-            <a:fillRect/>
-          </a:stretch>
-        </p:blipFill>
+          <p:cNvSpPr>
+            <a:spLocks noGrp="1"/>
+          </p:cNvSpPr>
+          <p:nvPr>
+            <p:ph type="title"/>
+          </p:nvPr>
+        </p:nvSpPr>
         <p:spPr>
           <a:xfrm>
-            <a:off x="10214811" y="192089"/>
-            <a:ext cx="1270905" cy="659432"/>
+            <a:off x="838200" y="693371"/>
+            <a:ext cx="10515600" cy="1325563"/>
           </a:xfrm>
-          <a:prstGeom prst="rect">
-            <a:avLst/>
-          </a:prstGeom>
         </p:spPr>
-      </p:pic>
-      <p:sp>
-        <p:nvSpPr>
-          <p:cNvPr id="2" name="矩形 1">
+        <p:txBody>
+          <a:bodyPr/>
+          <a:lstStyle/>
+          <a:p>
+            <a:r>
+              <a:rPr lang="en-US" altLang="zh-CN" dirty="0"/>
+              <a:t>Case 1: Initialization and network establishment</a:t>
+            </a:r>
+            <a:endParaRPr lang="zh-CN" altLang="en-US" dirty="0"/>
+          </a:p>
+        </p:txBody>
+      </p:sp>
+      <p:sp>
+        <p:nvSpPr>
+          <p:cNvPr id="5" name="内容占位符 4">
             <a:extLst>
               <a:ext uri="{FF2B5EF4-FFF2-40B4-BE49-F238E27FC236}">
-                <a16:creationId xmlns:a16="http://schemas.microsoft.com/office/drawing/2014/main" id="{ACD7414B-B3FA-A7F1-E91E-7720D1CA6F0A}"/>
+                <a16:creationId xmlns:a16="http://schemas.microsoft.com/office/drawing/2014/main" id="{720FBC12-0A06-BD07-EE46-3FD3602535A1}"/>
               </a:ext>
             </a:extLst>
           </p:cNvPr>
-          <p:cNvSpPr/>
-          <p:nvPr/>
+          <p:cNvSpPr>
+            <a:spLocks noGrp="1"/>
+          </p:cNvSpPr>
+          <p:nvPr>
+            <p:ph idx="1"/>
+          </p:nvPr>
         </p:nvSpPr>
         <p:spPr>
           <a:xfrm>
-            <a:off x="2132096" y="2129135"/>
-            <a:ext cx="7927811" cy="1754326"/>
+            <a:off x="838200" y="2200153"/>
+            <a:ext cx="10515600" cy="4023092"/>
           </a:xfrm>
-          <a:prstGeom prst="rect">
-            <a:avLst/>
-          </a:prstGeom>
-          <a:noFill/>
         </p:spPr>
         <p:txBody>
-          <a:bodyPr wrap="none" lIns="91440" tIns="45720" rIns="91440" bIns="45720">
-            <a:spAutoFit/>
-          </a:bodyPr>
-          <a:lstStyle/>
-          <a:p>
-            <a:pPr algn="ctr"/>
-            <a:r>
-              <a:rPr lang="en-US" altLang="zh-CN" sz="5400" b="0" cap="none" spc="0" dirty="0">
-                <a:ln w="0"/>
-                <a:solidFill>
-                  <a:schemeClr val="tx1"/>
-                </a:solidFill>
-                <a:effectLst>
-                  <a:outerShdw blurRad="38100" dist="19050" dir="2700000" algn="tl" rotWithShape="0">
-                    <a:schemeClr val="dk1">
-                      <a:alpha val="40000"/>
-                    </a:schemeClr>
-                  </a:outerShdw>
-                </a:effectLst>
-              </a:rPr>
-              <a:t>Thanks for Listening</a:t>
-            </a:r>
-          </a:p>
-          <a:p>
-            <a:pPr algn="ctr"/>
-            <a:r>
-              <a:rPr lang="en-US" altLang="zh-CN" sz="5400" b="0" cap="none" spc="0" dirty="0">
-                <a:ln w="0"/>
-                <a:solidFill>
-                  <a:schemeClr val="tx1"/>
-                </a:solidFill>
-                <a:effectLst>
-                  <a:outerShdw blurRad="38100" dist="19050" dir="2700000" algn="tl" rotWithShape="0">
-                    <a:schemeClr val="dk1">
-                      <a:alpha val="40000"/>
-                    </a:schemeClr>
-                  </a:outerShdw>
-                </a:effectLst>
-              </a:rPr>
-              <a:t>Any questions or feedback?</a:t>
-            </a:r>
-            <a:endParaRPr lang="zh-CN" altLang="en-US" sz="5400" b="0" cap="none" spc="0" dirty="0">
-              <a:ln w="0"/>
-              <a:solidFill>
-                <a:schemeClr val="tx1"/>
-              </a:solidFill>
-              <a:effectLst>
-                <a:outerShdw blurRad="38100" dist="19050" dir="2700000" algn="tl" rotWithShape="0">
-                  <a:schemeClr val="dk1">
-                    <a:alpha val="40000"/>
-                  </a:schemeClr>
-                </a:outerShdw>
-              </a:effectLst>
-            </a:endParaRPr>
+          <a:bodyPr/>
+          <a:lstStyle/>
+          <a:p>
+            <a:pPr>
+              <a:lnSpc>
+                <a:spcPct val="200000"/>
+              </a:lnSpc>
+            </a:pPr>
+            <a:r>
+              <a:rPr lang="en-US" altLang="zh-CN" dirty="0"/>
+              <a:t>Turn on all 7 boards -&gt; topology establishment</a:t>
+            </a:r>
+          </a:p>
+          <a:p>
+            <a:pPr>
+              <a:lnSpc>
+                <a:spcPct val="200000"/>
+              </a:lnSpc>
+            </a:pPr>
+            <a:r>
+              <a:rPr lang="en-US" altLang="zh-CN" dirty="0"/>
+              <a:t>Sensor value readout and display</a:t>
+            </a:r>
+          </a:p>
+          <a:p>
+            <a:pPr>
+              <a:lnSpc>
+                <a:spcPct val="100000"/>
+              </a:lnSpc>
+            </a:pPr>
+            <a:r>
+              <a:rPr lang="en-US" altLang="zh-CN" dirty="0"/>
+              <a:t>Evaluation of parking slot status (green -&gt; parking slot available, </a:t>
+            </a:r>
+          </a:p>
+          <a:p>
+            <a:pPr marL="0" indent="0">
+              <a:lnSpc>
+                <a:spcPct val="100000"/>
+              </a:lnSpc>
+              <a:buNone/>
+            </a:pPr>
+            <a:r>
+              <a:rPr lang="en-US" altLang="zh-CN" dirty="0"/>
+              <a:t>Red -&gt; parking slot possessed)</a:t>
+            </a:r>
+            <a:endParaRPr lang="zh-CN" altLang="en-US" dirty="0"/>
           </a:p>
         </p:txBody>
       </p:sp>
     </p:spTree>
     <p:extLst>
       <p:ext uri="{BB962C8B-B14F-4D97-AF65-F5344CB8AC3E}">
-        <p14:creationId xmlns:p14="http://schemas.microsoft.com/office/powerpoint/2010/main" val="374094616"/>
+        <p14:creationId xmlns:p14="http://schemas.microsoft.com/office/powerpoint/2010/main" val="835081325"/>
       </p:ext>
     </p:extLst>
   </p:cSld>

</xml_diff>

<commit_message>
Almost finla version of final ppt
</commit_message>
<xml_diff>
--- a/wsnlab-ss25-final-group2.pptx
+++ b/wsnlab-ss25-final-group2.pptx
@@ -16,13 +16,13 @@
     <p:sldId id="432" r:id="rId10"/>
     <p:sldId id="434" r:id="rId11"/>
     <p:sldId id="431" r:id="rId12"/>
-    <p:sldId id="357" r:id="rId13"/>
-    <p:sldId id="358" r:id="rId14"/>
-    <p:sldId id="426" r:id="rId15"/>
-    <p:sldId id="435" r:id="rId16"/>
-    <p:sldId id="427" r:id="rId17"/>
-    <p:sldId id="428" r:id="rId18"/>
-    <p:sldId id="262" r:id="rId19"/>
+    <p:sldId id="262" r:id="rId13"/>
+    <p:sldId id="357" r:id="rId14"/>
+    <p:sldId id="358" r:id="rId15"/>
+    <p:sldId id="426" r:id="rId16"/>
+    <p:sldId id="435" r:id="rId17"/>
+    <p:sldId id="427" r:id="rId18"/>
+    <p:sldId id="428" r:id="rId19"/>
   </p:sldIdLst>
   <p:sldSz cx="12192000" cy="6858000"/>
   <p:notesSz cx="6858000" cy="9144000"/>
@@ -8050,819 +8050,6 @@
   <p:cSld>
     <p:spTree>
       <p:nvGrpSpPr>
-        <p:cNvPr id="1" name=""/>
-        <p:cNvGrpSpPr/>
-        <p:nvPr/>
-      </p:nvGrpSpPr>
-      <p:grpSpPr>
-        <a:xfrm>
-          <a:off x="0" y="0"/>
-          <a:ext cx="0" cy="0"/>
-          <a:chOff x="0" y="0"/>
-          <a:chExt cx="0" cy="0"/>
-        </a:xfrm>
-      </p:grpSpPr>
-      <p:sp>
-        <p:nvSpPr>
-          <p:cNvPr id="2" name="标题 1">
-            <a:extLst>
-              <a:ext uri="{FF2B5EF4-FFF2-40B4-BE49-F238E27FC236}">
-                <a16:creationId xmlns:a16="http://schemas.microsoft.com/office/drawing/2014/main" id="{1F49A434-85AD-5400-39C8-687CCA487C63}"/>
-              </a:ext>
-            </a:extLst>
-          </p:cNvPr>
-          <p:cNvSpPr>
-            <a:spLocks noGrp="1"/>
-          </p:cNvSpPr>
-          <p:nvPr>
-            <p:ph type="title"/>
-          </p:nvPr>
-        </p:nvSpPr>
-        <p:spPr/>
-        <p:txBody>
-          <a:bodyPr/>
-          <a:lstStyle/>
-          <a:p>
-            <a:r>
-              <a:rPr lang="en-US" altLang="zh-CN" dirty="0"/>
-              <a:t>Demonstration cases  </a:t>
-            </a:r>
-            <a:endParaRPr lang="zh-CN" altLang="en-US" dirty="0"/>
-          </a:p>
-        </p:txBody>
-      </p:sp>
-      <p:sp>
-        <p:nvSpPr>
-          <p:cNvPr id="4" name="文本占位符 3">
-            <a:extLst>
-              <a:ext uri="{FF2B5EF4-FFF2-40B4-BE49-F238E27FC236}">
-                <a16:creationId xmlns:a16="http://schemas.microsoft.com/office/drawing/2014/main" id="{50427620-1FCF-C79D-E372-8620C8806ECE}"/>
-              </a:ext>
-            </a:extLst>
-          </p:cNvPr>
-          <p:cNvSpPr>
-            <a:spLocks noGrp="1"/>
-          </p:cNvSpPr>
-          <p:nvPr>
-            <p:ph type="body" idx="1"/>
-          </p:nvPr>
-        </p:nvSpPr>
-        <p:spPr/>
-        <p:txBody>
-          <a:bodyPr/>
-          <a:lstStyle/>
-          <a:p>
-            <a:endParaRPr lang="zh-CN" altLang="en-US"/>
-          </a:p>
-        </p:txBody>
-      </p:sp>
-      <p:pic>
-        <p:nvPicPr>
-          <p:cNvPr id="7172" name="Picture 4" descr="Demo Time - Live demos &amp; slides in VS Code">
-            <a:extLst>
-              <a:ext uri="{FF2B5EF4-FFF2-40B4-BE49-F238E27FC236}">
-                <a16:creationId xmlns:a16="http://schemas.microsoft.com/office/drawing/2014/main" id="{994F66A0-3F49-0FF7-8451-612211E05453}"/>
-              </a:ext>
-            </a:extLst>
-          </p:cNvPr>
-          <p:cNvPicPr>
-            <a:picLocks noChangeAspect="1" noChangeArrowheads="1"/>
-          </p:cNvPicPr>
-          <p:nvPr/>
-        </p:nvPicPr>
-        <p:blipFill>
-          <a:blip r:embed="rId2">
-            <a:extLst>
-              <a:ext uri="{28A0092B-C50C-407E-A947-70E740481C1C}">
-                <a14:useLocalDpi xmlns:a14="http://schemas.microsoft.com/office/drawing/2010/main" val="0"/>
-              </a:ext>
-            </a:extLst>
-          </a:blip>
-          <a:srcRect/>
-          <a:stretch>
-            <a:fillRect/>
-          </a:stretch>
-        </p:blipFill>
-        <p:spPr bwMode="auto">
-          <a:xfrm>
-            <a:off x="8456369" y="2400300"/>
-            <a:ext cx="2964237" cy="2747962"/>
-          </a:xfrm>
-          <a:prstGeom prst="rect">
-            <a:avLst/>
-          </a:prstGeom>
-          <a:noFill/>
-          <a:extLst>
-            <a:ext uri="{909E8E84-426E-40DD-AFC4-6F175D3DCCD1}">
-              <a14:hiddenFill xmlns:a14="http://schemas.microsoft.com/office/drawing/2010/main">
-                <a:solidFill>
-                  <a:srgbClr val="FFFFFF"/>
-                </a:solidFill>
-              </a14:hiddenFill>
-            </a:ext>
-          </a:extLst>
-        </p:spPr>
-      </p:pic>
-    </p:spTree>
-    <p:extLst>
-      <p:ext uri="{BB962C8B-B14F-4D97-AF65-F5344CB8AC3E}">
-        <p14:creationId xmlns:p14="http://schemas.microsoft.com/office/powerpoint/2010/main" val="3517742803"/>
-      </p:ext>
-    </p:extLst>
-  </p:cSld>
-  <p:clrMapOvr>
-    <a:masterClrMapping/>
-  </p:clrMapOvr>
-</p:sld>
-</file>
-
-<file path=ppt/slides/slide11.xml><?xml version="1.0" encoding="utf-8"?>
-<p:sld xmlns:a="http://schemas.openxmlformats.org/drawingml/2006/main" xmlns:r="http://schemas.openxmlformats.org/officeDocument/2006/relationships" xmlns:p="http://schemas.openxmlformats.org/presentationml/2006/main">
-  <p:cSld>
-    <p:spTree>
-      <p:nvGrpSpPr>
-        <p:cNvPr id="1" name=""/>
-        <p:cNvGrpSpPr/>
-        <p:nvPr/>
-      </p:nvGrpSpPr>
-      <p:grpSpPr>
-        <a:xfrm>
-          <a:off x="0" y="0"/>
-          <a:ext cx="0" cy="0"/>
-          <a:chOff x="0" y="0"/>
-          <a:chExt cx="0" cy="0"/>
-        </a:xfrm>
-      </p:grpSpPr>
-      <p:sp>
-        <p:nvSpPr>
-          <p:cNvPr id="4" name="标题 3">
-            <a:extLst>
-              <a:ext uri="{FF2B5EF4-FFF2-40B4-BE49-F238E27FC236}">
-                <a16:creationId xmlns:a16="http://schemas.microsoft.com/office/drawing/2014/main" id="{CBBC0695-91F6-A944-9E3A-0F0E3BD75B70}"/>
-              </a:ext>
-            </a:extLst>
-          </p:cNvPr>
-          <p:cNvSpPr>
-            <a:spLocks noGrp="1"/>
-          </p:cNvSpPr>
-          <p:nvPr>
-            <p:ph type="title"/>
-          </p:nvPr>
-        </p:nvSpPr>
-        <p:spPr>
-          <a:xfrm>
-            <a:off x="838200" y="734402"/>
-            <a:ext cx="10515600" cy="1325563"/>
-          </a:xfrm>
-        </p:spPr>
-        <p:txBody>
-          <a:bodyPr/>
-          <a:lstStyle/>
-          <a:p>
-            <a:r>
-              <a:rPr lang="en-US" altLang="zh-CN" dirty="0"/>
-              <a:t>Case 1: Initialization and network establishment</a:t>
-            </a:r>
-            <a:endParaRPr lang="zh-CN" altLang="en-US" dirty="0"/>
-          </a:p>
-        </p:txBody>
-      </p:sp>
-      <p:sp>
-        <p:nvSpPr>
-          <p:cNvPr id="5" name="内容占位符 4">
-            <a:extLst>
-              <a:ext uri="{FF2B5EF4-FFF2-40B4-BE49-F238E27FC236}">
-                <a16:creationId xmlns:a16="http://schemas.microsoft.com/office/drawing/2014/main" id="{720FBC12-0A06-BD07-EE46-3FD3602535A1}"/>
-              </a:ext>
-            </a:extLst>
-          </p:cNvPr>
-          <p:cNvSpPr>
-            <a:spLocks noGrp="1"/>
-          </p:cNvSpPr>
-          <p:nvPr>
-            <p:ph idx="1"/>
-          </p:nvPr>
-        </p:nvSpPr>
-        <p:spPr>
-          <a:xfrm>
-            <a:off x="838200" y="2200153"/>
-            <a:ext cx="10515600" cy="4023092"/>
-          </a:xfrm>
-        </p:spPr>
-        <p:txBody>
-          <a:bodyPr/>
-          <a:lstStyle/>
-          <a:p>
-            <a:pPr>
-              <a:lnSpc>
-                <a:spcPct val="150000"/>
-              </a:lnSpc>
-            </a:pPr>
-            <a:r>
-              <a:rPr lang="en-US" altLang="zh-CN" dirty="0"/>
-              <a:t>Turn on all 7 boards -&gt; topology establishment</a:t>
-            </a:r>
-          </a:p>
-          <a:p>
-            <a:pPr>
-              <a:lnSpc>
-                <a:spcPct val="150000"/>
-              </a:lnSpc>
-            </a:pPr>
-            <a:r>
-              <a:rPr lang="en-US" altLang="zh-CN" dirty="0"/>
-              <a:t>Sensor value readout and display</a:t>
-            </a:r>
-          </a:p>
-          <a:p>
-            <a:pPr>
-              <a:lnSpc>
-                <a:spcPct val="150000"/>
-              </a:lnSpc>
-            </a:pPr>
-            <a:r>
-              <a:rPr lang="en-US" altLang="zh-CN" dirty="0"/>
-              <a:t>Evaluation of parking slot status (green -&gt; parking slot available, </a:t>
-            </a:r>
-          </a:p>
-          <a:p>
-            <a:pPr marL="0" indent="0">
-              <a:lnSpc>
-                <a:spcPct val="150000"/>
-              </a:lnSpc>
-              <a:buNone/>
-            </a:pPr>
-            <a:r>
-              <a:rPr lang="en-US" altLang="zh-CN" dirty="0"/>
-              <a:t>red -&gt; parking slot possessed)</a:t>
-            </a:r>
-            <a:endParaRPr lang="zh-CN" altLang="en-US" dirty="0"/>
-          </a:p>
-        </p:txBody>
-      </p:sp>
-    </p:spTree>
-    <p:extLst>
-      <p:ext uri="{BB962C8B-B14F-4D97-AF65-F5344CB8AC3E}">
-        <p14:creationId xmlns:p14="http://schemas.microsoft.com/office/powerpoint/2010/main" val="835081325"/>
-      </p:ext>
-    </p:extLst>
-  </p:cSld>
-  <p:clrMapOvr>
-    <a:masterClrMapping/>
-  </p:clrMapOvr>
-</p:sld>
-</file>
-
-<file path=ppt/slides/slide12.xml><?xml version="1.0" encoding="utf-8"?>
-<p:sld xmlns:a="http://schemas.openxmlformats.org/drawingml/2006/main" xmlns:r="http://schemas.openxmlformats.org/officeDocument/2006/relationships" xmlns:p="http://schemas.openxmlformats.org/presentationml/2006/main">
-  <p:cSld>
-    <p:spTree>
-      <p:nvGrpSpPr>
-        <p:cNvPr id="1" name="">
-          <a:extLst>
-            <a:ext uri="{FF2B5EF4-FFF2-40B4-BE49-F238E27FC236}">
-              <a16:creationId xmlns:a16="http://schemas.microsoft.com/office/drawing/2014/main" id="{44FB16A6-A5F0-DCAC-8200-54363589F528}"/>
-            </a:ext>
-          </a:extLst>
-        </p:cNvPr>
-        <p:cNvGrpSpPr/>
-        <p:nvPr/>
-      </p:nvGrpSpPr>
-      <p:grpSpPr>
-        <a:xfrm>
-          <a:off x="0" y="0"/>
-          <a:ext cx="0" cy="0"/>
-          <a:chOff x="0" y="0"/>
-          <a:chExt cx="0" cy="0"/>
-        </a:xfrm>
-      </p:grpSpPr>
-      <p:sp>
-        <p:nvSpPr>
-          <p:cNvPr id="4" name="标题 3">
-            <a:extLst>
-              <a:ext uri="{FF2B5EF4-FFF2-40B4-BE49-F238E27FC236}">
-                <a16:creationId xmlns:a16="http://schemas.microsoft.com/office/drawing/2014/main" id="{9BA46F41-84C7-7A44-E258-BE779E59565F}"/>
-              </a:ext>
-            </a:extLst>
-          </p:cNvPr>
-          <p:cNvSpPr>
-            <a:spLocks noGrp="1"/>
-          </p:cNvSpPr>
-          <p:nvPr>
-            <p:ph type="title"/>
-          </p:nvPr>
-        </p:nvSpPr>
-        <p:spPr>
-          <a:xfrm>
-            <a:off x="838200" y="681037"/>
-            <a:ext cx="10515600" cy="1325563"/>
-          </a:xfrm>
-        </p:spPr>
-        <p:txBody>
-          <a:bodyPr/>
-          <a:lstStyle/>
-          <a:p>
-            <a:r>
-              <a:rPr lang="en-US" altLang="zh-CN" dirty="0"/>
-              <a:t>Case 2: Dynamic routing </a:t>
-            </a:r>
-            <a:endParaRPr lang="zh-CN" altLang="en-US" dirty="0"/>
-          </a:p>
-        </p:txBody>
-      </p:sp>
-      <p:sp>
-        <p:nvSpPr>
-          <p:cNvPr id="5" name="内容占位符 4">
-            <a:extLst>
-              <a:ext uri="{FF2B5EF4-FFF2-40B4-BE49-F238E27FC236}">
-                <a16:creationId xmlns:a16="http://schemas.microsoft.com/office/drawing/2014/main" id="{691D7C80-19FE-A52F-263F-DECA43DEFA71}"/>
-              </a:ext>
-            </a:extLst>
-          </p:cNvPr>
-          <p:cNvSpPr>
-            <a:spLocks noGrp="1"/>
-          </p:cNvSpPr>
-          <p:nvPr>
-            <p:ph idx="1"/>
-          </p:nvPr>
-        </p:nvSpPr>
-        <p:spPr/>
-        <p:txBody>
-          <a:bodyPr>
-            <a:normAutofit lnSpcReduction="10000"/>
-          </a:bodyPr>
-          <a:lstStyle/>
-          <a:p>
-            <a:pPr>
-              <a:lnSpc>
-                <a:spcPct val="150000"/>
-              </a:lnSpc>
-            </a:pPr>
-            <a:r>
-              <a:rPr lang="en-US" altLang="zh-CN" dirty="0"/>
-              <a:t>New node discovery: </a:t>
-            </a:r>
-          </a:p>
-          <a:p>
-            <a:pPr marL="0" indent="0">
-              <a:lnSpc>
-                <a:spcPct val="150000"/>
-              </a:lnSpc>
-              <a:buNone/>
-            </a:pPr>
-            <a:r>
-              <a:rPr lang="en-US" altLang="zh-CN" dirty="0"/>
-              <a:t>	1. turn on a new board (e.g. node 6)</a:t>
-            </a:r>
-          </a:p>
-          <a:p>
-            <a:pPr marL="0" indent="0">
-              <a:lnSpc>
-                <a:spcPct val="150000"/>
-              </a:lnSpc>
-              <a:buNone/>
-            </a:pPr>
-            <a:r>
-              <a:rPr lang="en-US" altLang="zh-CN" dirty="0"/>
-              <a:t>	2. Node listens to channel 12 for 5 times </a:t>
-            </a:r>
-          </a:p>
-          <a:p>
-            <a:pPr marL="0" indent="0">
-              <a:lnSpc>
-                <a:spcPct val="150000"/>
-              </a:lnSpc>
-              <a:buNone/>
-            </a:pPr>
-            <a:r>
-              <a:rPr lang="en-US" altLang="zh-CN" dirty="0"/>
-              <a:t>	3. if no flooding message is received </a:t>
-            </a:r>
-          </a:p>
-          <a:p>
-            <a:pPr marL="0" indent="0">
-              <a:lnSpc>
-                <a:spcPct val="150000"/>
-              </a:lnSpc>
-              <a:buNone/>
-            </a:pPr>
-            <a:r>
-              <a:rPr lang="en-US" altLang="zh-CN" dirty="0"/>
-              <a:t>	4. send discovery signal to neighbor nodes </a:t>
-            </a:r>
-          </a:p>
-          <a:p>
-            <a:pPr marL="0" indent="0">
-              <a:lnSpc>
-                <a:spcPct val="150000"/>
-              </a:lnSpc>
-              <a:buNone/>
-            </a:pPr>
-            <a:r>
-              <a:rPr lang="en-US" altLang="zh-CN" dirty="0"/>
-              <a:t>	5. master initialize network reset </a:t>
-            </a:r>
-          </a:p>
-          <a:p>
-            <a:pPr marL="0" indent="0">
-              <a:lnSpc>
-                <a:spcPct val="150000"/>
-              </a:lnSpc>
-              <a:buNone/>
-            </a:pPr>
-            <a:endParaRPr lang="en-US" altLang="zh-CN" dirty="0"/>
-          </a:p>
-          <a:p>
-            <a:pPr marL="0" indent="0">
-              <a:buNone/>
-            </a:pPr>
-            <a:endParaRPr lang="zh-CN" altLang="en-US" dirty="0"/>
-          </a:p>
-        </p:txBody>
-      </p:sp>
-    </p:spTree>
-    <p:extLst>
-      <p:ext uri="{BB962C8B-B14F-4D97-AF65-F5344CB8AC3E}">
-        <p14:creationId xmlns:p14="http://schemas.microsoft.com/office/powerpoint/2010/main" val="1376155735"/>
-      </p:ext>
-    </p:extLst>
-  </p:cSld>
-  <p:clrMapOvr>
-    <a:masterClrMapping/>
-  </p:clrMapOvr>
-</p:sld>
-</file>
-
-<file path=ppt/slides/slide13.xml><?xml version="1.0" encoding="utf-8"?>
-<p:sld xmlns:a="http://schemas.openxmlformats.org/drawingml/2006/main" xmlns:r="http://schemas.openxmlformats.org/officeDocument/2006/relationships" xmlns:p="http://schemas.openxmlformats.org/presentationml/2006/main">
-  <p:cSld>
-    <p:spTree>
-      <p:nvGrpSpPr>
-        <p:cNvPr id="1" name="">
-          <a:extLst>
-            <a:ext uri="{FF2B5EF4-FFF2-40B4-BE49-F238E27FC236}">
-              <a16:creationId xmlns:a16="http://schemas.microsoft.com/office/drawing/2014/main" id="{FAFD2680-F76C-34B5-1D4C-8D08503A56C6}"/>
-            </a:ext>
-          </a:extLst>
-        </p:cNvPr>
-        <p:cNvGrpSpPr/>
-        <p:nvPr/>
-      </p:nvGrpSpPr>
-      <p:grpSpPr>
-        <a:xfrm>
-          <a:off x="0" y="0"/>
-          <a:ext cx="0" cy="0"/>
-          <a:chOff x="0" y="0"/>
-          <a:chExt cx="0" cy="0"/>
-        </a:xfrm>
-      </p:grpSpPr>
-      <p:sp>
-        <p:nvSpPr>
-          <p:cNvPr id="4" name="标题 3">
-            <a:extLst>
-              <a:ext uri="{FF2B5EF4-FFF2-40B4-BE49-F238E27FC236}">
-                <a16:creationId xmlns:a16="http://schemas.microsoft.com/office/drawing/2014/main" id="{4AD5A190-036A-E844-2AEA-0CD5AF2DD0AE}"/>
-              </a:ext>
-            </a:extLst>
-          </p:cNvPr>
-          <p:cNvSpPr>
-            <a:spLocks noGrp="1"/>
-          </p:cNvSpPr>
-          <p:nvPr>
-            <p:ph type="title"/>
-          </p:nvPr>
-        </p:nvSpPr>
-        <p:spPr>
-          <a:xfrm>
-            <a:off x="838200" y="681037"/>
-            <a:ext cx="10515600" cy="1325563"/>
-          </a:xfrm>
-        </p:spPr>
-        <p:txBody>
-          <a:bodyPr/>
-          <a:lstStyle/>
-          <a:p>
-            <a:r>
-              <a:rPr lang="en-US" altLang="zh-CN" dirty="0"/>
-              <a:t>Case 2: Dynamic routing </a:t>
-            </a:r>
-            <a:endParaRPr lang="zh-CN" altLang="en-US" dirty="0"/>
-          </a:p>
-        </p:txBody>
-      </p:sp>
-      <p:sp>
-        <p:nvSpPr>
-          <p:cNvPr id="5" name="内容占位符 4">
-            <a:extLst>
-              <a:ext uri="{FF2B5EF4-FFF2-40B4-BE49-F238E27FC236}">
-                <a16:creationId xmlns:a16="http://schemas.microsoft.com/office/drawing/2014/main" id="{75F21884-71FD-EF92-B9EF-9781A94CCF58}"/>
-              </a:ext>
-            </a:extLst>
-          </p:cNvPr>
-          <p:cNvSpPr>
-            <a:spLocks noGrp="1"/>
-          </p:cNvSpPr>
-          <p:nvPr>
-            <p:ph idx="1"/>
-          </p:nvPr>
-        </p:nvSpPr>
-        <p:spPr/>
-        <p:txBody>
-          <a:bodyPr>
-            <a:normAutofit/>
-          </a:bodyPr>
-          <a:lstStyle/>
-          <a:p>
-            <a:pPr>
-              <a:lnSpc>
-                <a:spcPct val="150000"/>
-              </a:lnSpc>
-            </a:pPr>
-            <a:r>
-              <a:rPr lang="en-US" altLang="zh-CN" dirty="0"/>
-              <a:t>Existing node failure: </a:t>
-            </a:r>
-          </a:p>
-          <a:p>
-            <a:pPr marL="914400" lvl="1" indent="-457200">
-              <a:lnSpc>
-                <a:spcPct val="150000"/>
-              </a:lnSpc>
-              <a:buAutoNum type="arabicPeriod"/>
-            </a:pPr>
-            <a:r>
-              <a:rPr lang="en-US" altLang="zh-CN" dirty="0"/>
-              <a:t>turn off a working node (simulate node failure)</a:t>
-            </a:r>
-          </a:p>
-          <a:p>
-            <a:pPr marL="914400" lvl="1" indent="-457200">
-              <a:lnSpc>
-                <a:spcPct val="150000"/>
-              </a:lnSpc>
-              <a:buAutoNum type="arabicPeriod"/>
-            </a:pPr>
-            <a:r>
-              <a:rPr lang="en-US" altLang="zh-CN" dirty="0"/>
-              <a:t>master does not receive its heartbeat signal </a:t>
-            </a:r>
-          </a:p>
-          <a:p>
-            <a:pPr marL="914400" lvl="1" indent="-457200">
-              <a:lnSpc>
-                <a:spcPct val="150000"/>
-              </a:lnSpc>
-              <a:buAutoNum type="arabicPeriod"/>
-            </a:pPr>
-            <a:r>
-              <a:rPr lang="en-US" altLang="zh-CN" dirty="0"/>
-              <a:t>master initialize network reset </a:t>
-            </a:r>
-          </a:p>
-          <a:p>
-            <a:pPr marL="0" indent="0">
-              <a:lnSpc>
-                <a:spcPct val="150000"/>
-              </a:lnSpc>
-              <a:buNone/>
-            </a:pPr>
-            <a:endParaRPr lang="en-US" altLang="zh-CN" dirty="0"/>
-          </a:p>
-          <a:p>
-            <a:pPr marL="0" indent="0">
-              <a:buNone/>
-            </a:pPr>
-            <a:endParaRPr lang="zh-CN" altLang="en-US" dirty="0"/>
-          </a:p>
-        </p:txBody>
-      </p:sp>
-    </p:spTree>
-    <p:extLst>
-      <p:ext uri="{BB962C8B-B14F-4D97-AF65-F5344CB8AC3E}">
-        <p14:creationId xmlns:p14="http://schemas.microsoft.com/office/powerpoint/2010/main" val="83175394"/>
-      </p:ext>
-    </p:extLst>
-  </p:cSld>
-  <p:clrMapOvr>
-    <a:masterClrMapping/>
-  </p:clrMapOvr>
-</p:sld>
-</file>
-
-<file path=ppt/slides/slide14.xml><?xml version="1.0" encoding="utf-8"?>
-<p:sld xmlns:a="http://schemas.openxmlformats.org/drawingml/2006/main" xmlns:r="http://schemas.openxmlformats.org/officeDocument/2006/relationships" xmlns:p="http://schemas.openxmlformats.org/presentationml/2006/main">
-  <p:cSld>
-    <p:spTree>
-      <p:nvGrpSpPr>
-        <p:cNvPr id="1" name="">
-          <a:extLst>
-            <a:ext uri="{FF2B5EF4-FFF2-40B4-BE49-F238E27FC236}">
-              <a16:creationId xmlns:a16="http://schemas.microsoft.com/office/drawing/2014/main" id="{7670DE80-71AA-BBC3-FF9D-4B97D0CFDC7D}"/>
-            </a:ext>
-          </a:extLst>
-        </p:cNvPr>
-        <p:cNvGrpSpPr/>
-        <p:nvPr/>
-      </p:nvGrpSpPr>
-      <p:grpSpPr>
-        <a:xfrm>
-          <a:off x="0" y="0"/>
-          <a:ext cx="0" cy="0"/>
-          <a:chOff x="0" y="0"/>
-          <a:chExt cx="0" cy="0"/>
-        </a:xfrm>
-      </p:grpSpPr>
-      <p:sp>
-        <p:nvSpPr>
-          <p:cNvPr id="4" name="标题 3">
-            <a:extLst>
-              <a:ext uri="{FF2B5EF4-FFF2-40B4-BE49-F238E27FC236}">
-                <a16:creationId xmlns:a16="http://schemas.microsoft.com/office/drawing/2014/main" id="{9DB51283-FE0C-A834-19B7-C2138A6A2CAF}"/>
-              </a:ext>
-            </a:extLst>
-          </p:cNvPr>
-          <p:cNvSpPr>
-            <a:spLocks noGrp="1"/>
-          </p:cNvSpPr>
-          <p:nvPr>
-            <p:ph type="title"/>
-          </p:nvPr>
-        </p:nvSpPr>
-        <p:spPr>
-          <a:xfrm>
-            <a:off x="838200" y="681649"/>
-            <a:ext cx="8575431" cy="1325563"/>
-          </a:xfrm>
-        </p:spPr>
-        <p:txBody>
-          <a:bodyPr/>
-          <a:lstStyle/>
-          <a:p>
-            <a:r>
-              <a:rPr lang="en-US" altLang="zh-CN" dirty="0"/>
-              <a:t>Case 3: Reactive network</a:t>
-            </a:r>
-            <a:endParaRPr lang="zh-CN" altLang="en-US" dirty="0"/>
-          </a:p>
-        </p:txBody>
-      </p:sp>
-      <p:sp>
-        <p:nvSpPr>
-          <p:cNvPr id="5" name="内容占位符 4">
-            <a:extLst>
-              <a:ext uri="{FF2B5EF4-FFF2-40B4-BE49-F238E27FC236}">
-                <a16:creationId xmlns:a16="http://schemas.microsoft.com/office/drawing/2014/main" id="{7767E8BA-A499-793E-711B-4BE85D248262}"/>
-              </a:ext>
-            </a:extLst>
-          </p:cNvPr>
-          <p:cNvSpPr>
-            <a:spLocks noGrp="1"/>
-          </p:cNvSpPr>
-          <p:nvPr>
-            <p:ph idx="1"/>
-          </p:nvPr>
-        </p:nvSpPr>
-        <p:spPr>
-          <a:xfrm>
-            <a:off x="838200" y="2223598"/>
-            <a:ext cx="10515600" cy="4351338"/>
-          </a:xfrm>
-        </p:spPr>
-        <p:txBody>
-          <a:bodyPr/>
-          <a:lstStyle/>
-          <a:p>
-            <a:pPr>
-              <a:lnSpc>
-                <a:spcPct val="150000"/>
-              </a:lnSpc>
-            </a:pPr>
-            <a:r>
-              <a:rPr lang="en-US" altLang="zh-CN" dirty="0"/>
-              <a:t>Sensor value will only be transmitted and displayed when it changes dramatically (change of light &gt; 50 lux or distance &gt; 10cm)</a:t>
-            </a:r>
-            <a:endParaRPr lang="zh-CN" altLang="en-US" dirty="0"/>
-          </a:p>
-        </p:txBody>
-      </p:sp>
-    </p:spTree>
-    <p:extLst>
-      <p:ext uri="{BB962C8B-B14F-4D97-AF65-F5344CB8AC3E}">
-        <p14:creationId xmlns:p14="http://schemas.microsoft.com/office/powerpoint/2010/main" val="3782980413"/>
-      </p:ext>
-    </p:extLst>
-  </p:cSld>
-  <p:clrMapOvr>
-    <a:masterClrMapping/>
-  </p:clrMapOvr>
-</p:sld>
-</file>
-
-<file path=ppt/slides/slide15.xml><?xml version="1.0" encoding="utf-8"?>
-<p:sld xmlns:a="http://schemas.openxmlformats.org/drawingml/2006/main" xmlns:r="http://schemas.openxmlformats.org/officeDocument/2006/relationships" xmlns:p="http://schemas.openxmlformats.org/presentationml/2006/main">
-  <p:cSld>
-    <p:spTree>
-      <p:nvGrpSpPr>
-        <p:cNvPr id="1" name="">
-          <a:extLst>
-            <a:ext uri="{FF2B5EF4-FFF2-40B4-BE49-F238E27FC236}">
-              <a16:creationId xmlns:a16="http://schemas.microsoft.com/office/drawing/2014/main" id="{7EB5FBD8-F322-A349-450B-E738F819F082}"/>
-            </a:ext>
-          </a:extLst>
-        </p:cNvPr>
-        <p:cNvGrpSpPr/>
-        <p:nvPr/>
-      </p:nvGrpSpPr>
-      <p:grpSpPr>
-        <a:xfrm>
-          <a:off x="0" y="0"/>
-          <a:ext cx="0" cy="0"/>
-          <a:chOff x="0" y="0"/>
-          <a:chExt cx="0" cy="0"/>
-        </a:xfrm>
-      </p:grpSpPr>
-      <p:sp>
-        <p:nvSpPr>
-          <p:cNvPr id="4" name="标题 3">
-            <a:extLst>
-              <a:ext uri="{FF2B5EF4-FFF2-40B4-BE49-F238E27FC236}">
-                <a16:creationId xmlns:a16="http://schemas.microsoft.com/office/drawing/2014/main" id="{40FEA80F-EC0D-2E34-C8B7-208901881140}"/>
-              </a:ext>
-            </a:extLst>
-          </p:cNvPr>
-          <p:cNvSpPr>
-            <a:spLocks noGrp="1"/>
-          </p:cNvSpPr>
-          <p:nvPr>
-            <p:ph type="title"/>
-          </p:nvPr>
-        </p:nvSpPr>
-        <p:spPr>
-          <a:xfrm>
-            <a:off x="838200" y="500062"/>
-            <a:ext cx="10515600" cy="1325563"/>
-          </a:xfrm>
-        </p:spPr>
-        <p:txBody>
-          <a:bodyPr/>
-          <a:lstStyle/>
-          <a:p>
-            <a:r>
-              <a:rPr lang="en-US" altLang="zh-CN" dirty="0"/>
-              <a:t>Case 4: Low-energy awareness routing</a:t>
-            </a:r>
-            <a:endParaRPr lang="zh-CN" altLang="en-US" dirty="0"/>
-          </a:p>
-        </p:txBody>
-      </p:sp>
-      <p:sp>
-        <p:nvSpPr>
-          <p:cNvPr id="5" name="内容占位符 4">
-            <a:extLst>
-              <a:ext uri="{FF2B5EF4-FFF2-40B4-BE49-F238E27FC236}">
-                <a16:creationId xmlns:a16="http://schemas.microsoft.com/office/drawing/2014/main" id="{1F9CBB7B-50DE-C537-68AD-ACCFF553EDAC}"/>
-              </a:ext>
-            </a:extLst>
-          </p:cNvPr>
-          <p:cNvSpPr>
-            <a:spLocks noGrp="1"/>
-          </p:cNvSpPr>
-          <p:nvPr>
-            <p:ph idx="1"/>
-          </p:nvPr>
-        </p:nvSpPr>
-        <p:spPr>
-          <a:xfrm>
-            <a:off x="838200" y="1925271"/>
-            <a:ext cx="10515600" cy="4351338"/>
-          </a:xfrm>
-        </p:spPr>
-        <p:txBody>
-          <a:bodyPr/>
-          <a:lstStyle/>
-          <a:p>
-            <a:endParaRPr lang="zh-CN" altLang="en-US" dirty="0"/>
-          </a:p>
-        </p:txBody>
-      </p:sp>
-    </p:spTree>
-    <p:extLst>
-      <p:ext uri="{BB962C8B-B14F-4D97-AF65-F5344CB8AC3E}">
-        <p14:creationId xmlns:p14="http://schemas.microsoft.com/office/powerpoint/2010/main" val="1859502817"/>
-      </p:ext>
-    </p:extLst>
-  </p:cSld>
-  <p:clrMapOvr>
-    <a:masterClrMapping/>
-  </p:clrMapOvr>
-</p:sld>
-</file>
-
-<file path=ppt/slides/slide16.xml><?xml version="1.0" encoding="utf-8"?>
-<p:sld xmlns:a="http://schemas.openxmlformats.org/drawingml/2006/main" xmlns:r="http://schemas.openxmlformats.org/officeDocument/2006/relationships" xmlns:p="http://schemas.openxmlformats.org/presentationml/2006/main">
-  <p:cSld>
-    <p:spTree>
-      <p:nvGrpSpPr>
         <p:cNvPr id="1" name="">
           <a:extLst>
             <a:ext uri="{FF2B5EF4-FFF2-40B4-BE49-F238E27FC236}">
@@ -8925,8 +8112,8 @@
         </p:nvSpPr>
         <p:spPr>
           <a:xfrm>
-            <a:off x="2132096" y="2129135"/>
-            <a:ext cx="7927811" cy="1754326"/>
+            <a:off x="2412044" y="2129135"/>
+            <a:ext cx="7367914" cy="1754326"/>
           </a:xfrm>
           <a:prstGeom prst="rect">
             <a:avLst/>
@@ -8954,8 +8141,60 @@
                   </a:outerShdw>
                 </a:effectLst>
               </a:rPr>
-              <a:t>Thanks for Listening</a:t>
-            </a:r>
+              <a:t>Thanks for </a:t>
+            </a:r>
+            <a:r>
+              <a:rPr lang="en-US" altLang="zh-CN" sz="5400" dirty="0">
+                <a:ln w="0"/>
+                <a:effectLst>
+                  <a:outerShdw blurRad="38100" dist="19050" dir="2700000" algn="tl" rotWithShape="0">
+                    <a:schemeClr val="dk1">
+                      <a:alpha val="40000"/>
+                    </a:schemeClr>
+                  </a:outerShdw>
+                </a:effectLst>
+              </a:rPr>
+              <a:t>your</a:t>
+            </a:r>
+            <a:r>
+              <a:rPr lang="zh-CN" altLang="en-US" sz="5400" dirty="0">
+                <a:ln w="0"/>
+                <a:effectLst>
+                  <a:outerShdw blurRad="38100" dist="19050" dir="2700000" algn="tl" rotWithShape="0">
+                    <a:schemeClr val="dk1">
+                      <a:alpha val="40000"/>
+                    </a:schemeClr>
+                  </a:outerShdw>
+                </a:effectLst>
+              </a:rPr>
+              <a:t> </a:t>
+            </a:r>
+            <a:r>
+              <a:rPr lang="en-US" altLang="zh-CN" sz="5400" dirty="0">
+                <a:ln w="0"/>
+                <a:effectLst>
+                  <a:outerShdw blurRad="38100" dist="19050" dir="2700000" algn="tl" rotWithShape="0">
+                    <a:schemeClr val="dk1">
+                      <a:alpha val="40000"/>
+                    </a:schemeClr>
+                  </a:outerShdw>
+                </a:effectLst>
+              </a:rPr>
+              <a:t>Attention</a:t>
+            </a:r>
+            <a:endParaRPr lang="en-US" altLang="zh-CN" sz="5400" b="0" cap="none" spc="0" dirty="0">
+              <a:ln w="0"/>
+              <a:solidFill>
+                <a:schemeClr val="tx1"/>
+              </a:solidFill>
+              <a:effectLst>
+                <a:outerShdw blurRad="38100" dist="19050" dir="2700000" algn="tl" rotWithShape="0">
+                  <a:schemeClr val="dk1">
+                    <a:alpha val="40000"/>
+                  </a:schemeClr>
+                </a:outerShdw>
+              </a:effectLst>
+            </a:endParaRPr>
           </a:p>
           <a:p>
             <a:pPr algn="ctr"/>
@@ -8973,7 +8212,7 @@
                   </a:outerShdw>
                 </a:effectLst>
               </a:rPr>
-              <a:t>Any questions or feedback?</a:t>
+              <a:t>Any questions?</a:t>
             </a:r>
             <a:endParaRPr lang="zh-CN" altLang="en-US" sz="5400" b="0" cap="none" spc="0" dirty="0">
               <a:ln w="0"/>
@@ -9095,6 +8334,822 @@
   <p:clrMapOvr>
     <a:masterClrMapping/>
   </p:clrMapOvr>
+  <p:transition spd="slow">
+    <p:wipe/>
+  </p:transition>
+</p:sld>
+</file>
+
+<file path=ppt/slides/slide11.xml><?xml version="1.0" encoding="utf-8"?>
+<p:sld xmlns:a="http://schemas.openxmlformats.org/drawingml/2006/main" xmlns:r="http://schemas.openxmlformats.org/officeDocument/2006/relationships" xmlns:p="http://schemas.openxmlformats.org/presentationml/2006/main">
+  <p:cSld>
+    <p:spTree>
+      <p:nvGrpSpPr>
+        <p:cNvPr id="1" name=""/>
+        <p:cNvGrpSpPr/>
+        <p:nvPr/>
+      </p:nvGrpSpPr>
+      <p:grpSpPr>
+        <a:xfrm>
+          <a:off x="0" y="0"/>
+          <a:ext cx="0" cy="0"/>
+          <a:chOff x="0" y="0"/>
+          <a:chExt cx="0" cy="0"/>
+        </a:xfrm>
+      </p:grpSpPr>
+      <p:sp>
+        <p:nvSpPr>
+          <p:cNvPr id="2" name="标题 1">
+            <a:extLst>
+              <a:ext uri="{FF2B5EF4-FFF2-40B4-BE49-F238E27FC236}">
+                <a16:creationId xmlns:a16="http://schemas.microsoft.com/office/drawing/2014/main" id="{1F49A434-85AD-5400-39C8-687CCA487C63}"/>
+              </a:ext>
+            </a:extLst>
+          </p:cNvPr>
+          <p:cNvSpPr>
+            <a:spLocks noGrp="1"/>
+          </p:cNvSpPr>
+          <p:nvPr>
+            <p:ph type="title"/>
+          </p:nvPr>
+        </p:nvSpPr>
+        <p:spPr/>
+        <p:txBody>
+          <a:bodyPr/>
+          <a:lstStyle/>
+          <a:p>
+            <a:r>
+              <a:rPr lang="en-US" altLang="zh-CN" dirty="0"/>
+              <a:t>Demonstration cases  </a:t>
+            </a:r>
+            <a:endParaRPr lang="zh-CN" altLang="en-US" dirty="0"/>
+          </a:p>
+        </p:txBody>
+      </p:sp>
+      <p:sp>
+        <p:nvSpPr>
+          <p:cNvPr id="4" name="文本占位符 3">
+            <a:extLst>
+              <a:ext uri="{FF2B5EF4-FFF2-40B4-BE49-F238E27FC236}">
+                <a16:creationId xmlns:a16="http://schemas.microsoft.com/office/drawing/2014/main" id="{50427620-1FCF-C79D-E372-8620C8806ECE}"/>
+              </a:ext>
+            </a:extLst>
+          </p:cNvPr>
+          <p:cNvSpPr>
+            <a:spLocks noGrp="1"/>
+          </p:cNvSpPr>
+          <p:nvPr>
+            <p:ph type="body" idx="1"/>
+          </p:nvPr>
+        </p:nvSpPr>
+        <p:spPr/>
+        <p:txBody>
+          <a:bodyPr/>
+          <a:lstStyle/>
+          <a:p>
+            <a:endParaRPr lang="zh-CN" altLang="en-US"/>
+          </a:p>
+        </p:txBody>
+      </p:sp>
+      <p:pic>
+        <p:nvPicPr>
+          <p:cNvPr id="7172" name="Picture 4" descr="Demo Time - Live demos &amp; slides in VS Code">
+            <a:extLst>
+              <a:ext uri="{FF2B5EF4-FFF2-40B4-BE49-F238E27FC236}">
+                <a16:creationId xmlns:a16="http://schemas.microsoft.com/office/drawing/2014/main" id="{994F66A0-3F49-0FF7-8451-612211E05453}"/>
+              </a:ext>
+            </a:extLst>
+          </p:cNvPr>
+          <p:cNvPicPr>
+            <a:picLocks noChangeAspect="1" noChangeArrowheads="1"/>
+          </p:cNvPicPr>
+          <p:nvPr/>
+        </p:nvPicPr>
+        <p:blipFill>
+          <a:blip r:embed="rId2">
+            <a:extLst>
+              <a:ext uri="{28A0092B-C50C-407E-A947-70E740481C1C}">
+                <a14:useLocalDpi xmlns:a14="http://schemas.microsoft.com/office/drawing/2010/main" val="0"/>
+              </a:ext>
+            </a:extLst>
+          </a:blip>
+          <a:srcRect/>
+          <a:stretch>
+            <a:fillRect/>
+          </a:stretch>
+        </p:blipFill>
+        <p:spPr bwMode="auto">
+          <a:xfrm>
+            <a:off x="8456369" y="2400300"/>
+            <a:ext cx="2964237" cy="2747962"/>
+          </a:xfrm>
+          <a:prstGeom prst="rect">
+            <a:avLst/>
+          </a:prstGeom>
+          <a:noFill/>
+          <a:extLst>
+            <a:ext uri="{909E8E84-426E-40DD-AFC4-6F175D3DCCD1}">
+              <a14:hiddenFill xmlns:a14="http://schemas.microsoft.com/office/drawing/2010/main">
+                <a:solidFill>
+                  <a:srgbClr val="FFFFFF"/>
+                </a:solidFill>
+              </a14:hiddenFill>
+            </a:ext>
+          </a:extLst>
+        </p:spPr>
+      </p:pic>
+    </p:spTree>
+    <p:extLst>
+      <p:ext uri="{BB962C8B-B14F-4D97-AF65-F5344CB8AC3E}">
+        <p14:creationId xmlns:p14="http://schemas.microsoft.com/office/powerpoint/2010/main" val="3517742803"/>
+      </p:ext>
+    </p:extLst>
+  </p:cSld>
+  <p:clrMapOvr>
+    <a:masterClrMapping/>
+  </p:clrMapOvr>
+</p:sld>
+</file>
+
+<file path=ppt/slides/slide12.xml><?xml version="1.0" encoding="utf-8"?>
+<p:sld xmlns:a="http://schemas.openxmlformats.org/drawingml/2006/main" xmlns:r="http://schemas.openxmlformats.org/officeDocument/2006/relationships" xmlns:p="http://schemas.openxmlformats.org/presentationml/2006/main">
+  <p:cSld>
+    <p:spTree>
+      <p:nvGrpSpPr>
+        <p:cNvPr id="1" name=""/>
+        <p:cNvGrpSpPr/>
+        <p:nvPr/>
+      </p:nvGrpSpPr>
+      <p:grpSpPr>
+        <a:xfrm>
+          <a:off x="0" y="0"/>
+          <a:ext cx="0" cy="0"/>
+          <a:chOff x="0" y="0"/>
+          <a:chExt cx="0" cy="0"/>
+        </a:xfrm>
+      </p:grpSpPr>
+      <p:sp>
+        <p:nvSpPr>
+          <p:cNvPr id="4" name="标题 3">
+            <a:extLst>
+              <a:ext uri="{FF2B5EF4-FFF2-40B4-BE49-F238E27FC236}">
+                <a16:creationId xmlns:a16="http://schemas.microsoft.com/office/drawing/2014/main" id="{CBBC0695-91F6-A944-9E3A-0F0E3BD75B70}"/>
+              </a:ext>
+            </a:extLst>
+          </p:cNvPr>
+          <p:cNvSpPr>
+            <a:spLocks noGrp="1"/>
+          </p:cNvSpPr>
+          <p:nvPr>
+            <p:ph type="title"/>
+          </p:nvPr>
+        </p:nvSpPr>
+        <p:spPr>
+          <a:xfrm>
+            <a:off x="838200" y="734402"/>
+            <a:ext cx="10515600" cy="1325563"/>
+          </a:xfrm>
+        </p:spPr>
+        <p:txBody>
+          <a:bodyPr/>
+          <a:lstStyle/>
+          <a:p>
+            <a:r>
+              <a:rPr lang="en-US" altLang="zh-CN" dirty="0"/>
+              <a:t>Case 1: Initialization and network establishment</a:t>
+            </a:r>
+            <a:endParaRPr lang="zh-CN" altLang="en-US" dirty="0"/>
+          </a:p>
+        </p:txBody>
+      </p:sp>
+      <p:sp>
+        <p:nvSpPr>
+          <p:cNvPr id="5" name="内容占位符 4">
+            <a:extLst>
+              <a:ext uri="{FF2B5EF4-FFF2-40B4-BE49-F238E27FC236}">
+                <a16:creationId xmlns:a16="http://schemas.microsoft.com/office/drawing/2014/main" id="{720FBC12-0A06-BD07-EE46-3FD3602535A1}"/>
+              </a:ext>
+            </a:extLst>
+          </p:cNvPr>
+          <p:cNvSpPr>
+            <a:spLocks noGrp="1"/>
+          </p:cNvSpPr>
+          <p:nvPr>
+            <p:ph idx="1"/>
+          </p:nvPr>
+        </p:nvSpPr>
+        <p:spPr>
+          <a:xfrm>
+            <a:off x="838200" y="2200153"/>
+            <a:ext cx="10515600" cy="4023092"/>
+          </a:xfrm>
+        </p:spPr>
+        <p:txBody>
+          <a:bodyPr/>
+          <a:lstStyle/>
+          <a:p>
+            <a:pPr>
+              <a:lnSpc>
+                <a:spcPct val="150000"/>
+              </a:lnSpc>
+            </a:pPr>
+            <a:r>
+              <a:rPr lang="en-US" altLang="zh-CN" dirty="0"/>
+              <a:t>Turn on all 7 boards -&gt; topology establishment</a:t>
+            </a:r>
+          </a:p>
+          <a:p>
+            <a:pPr>
+              <a:lnSpc>
+                <a:spcPct val="150000"/>
+              </a:lnSpc>
+            </a:pPr>
+            <a:r>
+              <a:rPr lang="en-US" altLang="zh-CN" dirty="0"/>
+              <a:t>Sensor value readout and display</a:t>
+            </a:r>
+          </a:p>
+          <a:p>
+            <a:pPr>
+              <a:lnSpc>
+                <a:spcPct val="150000"/>
+              </a:lnSpc>
+            </a:pPr>
+            <a:r>
+              <a:rPr lang="en-US" altLang="zh-CN" dirty="0"/>
+              <a:t>Evaluation of parking slot status (green -&gt; parking slot available, </a:t>
+            </a:r>
+          </a:p>
+          <a:p>
+            <a:pPr marL="0" indent="0">
+              <a:lnSpc>
+                <a:spcPct val="150000"/>
+              </a:lnSpc>
+              <a:buNone/>
+            </a:pPr>
+            <a:r>
+              <a:rPr lang="en-US" altLang="zh-CN" dirty="0"/>
+              <a:t>red -&gt; parking slot possessed)</a:t>
+            </a:r>
+            <a:endParaRPr lang="zh-CN" altLang="en-US" dirty="0"/>
+          </a:p>
+        </p:txBody>
+      </p:sp>
+    </p:spTree>
+    <p:extLst>
+      <p:ext uri="{BB962C8B-B14F-4D97-AF65-F5344CB8AC3E}">
+        <p14:creationId xmlns:p14="http://schemas.microsoft.com/office/powerpoint/2010/main" val="835081325"/>
+      </p:ext>
+    </p:extLst>
+  </p:cSld>
+  <p:clrMapOvr>
+    <a:masterClrMapping/>
+  </p:clrMapOvr>
+</p:sld>
+</file>
+
+<file path=ppt/slides/slide13.xml><?xml version="1.0" encoding="utf-8"?>
+<p:sld xmlns:a="http://schemas.openxmlformats.org/drawingml/2006/main" xmlns:r="http://schemas.openxmlformats.org/officeDocument/2006/relationships" xmlns:p="http://schemas.openxmlformats.org/presentationml/2006/main">
+  <p:cSld>
+    <p:spTree>
+      <p:nvGrpSpPr>
+        <p:cNvPr id="1" name="">
+          <a:extLst>
+            <a:ext uri="{FF2B5EF4-FFF2-40B4-BE49-F238E27FC236}">
+              <a16:creationId xmlns:a16="http://schemas.microsoft.com/office/drawing/2014/main" id="{44FB16A6-A5F0-DCAC-8200-54363589F528}"/>
+            </a:ext>
+          </a:extLst>
+        </p:cNvPr>
+        <p:cNvGrpSpPr/>
+        <p:nvPr/>
+      </p:nvGrpSpPr>
+      <p:grpSpPr>
+        <a:xfrm>
+          <a:off x="0" y="0"/>
+          <a:ext cx="0" cy="0"/>
+          <a:chOff x="0" y="0"/>
+          <a:chExt cx="0" cy="0"/>
+        </a:xfrm>
+      </p:grpSpPr>
+      <p:sp>
+        <p:nvSpPr>
+          <p:cNvPr id="4" name="标题 3">
+            <a:extLst>
+              <a:ext uri="{FF2B5EF4-FFF2-40B4-BE49-F238E27FC236}">
+                <a16:creationId xmlns:a16="http://schemas.microsoft.com/office/drawing/2014/main" id="{9BA46F41-84C7-7A44-E258-BE779E59565F}"/>
+              </a:ext>
+            </a:extLst>
+          </p:cNvPr>
+          <p:cNvSpPr>
+            <a:spLocks noGrp="1"/>
+          </p:cNvSpPr>
+          <p:nvPr>
+            <p:ph type="title"/>
+          </p:nvPr>
+        </p:nvSpPr>
+        <p:spPr>
+          <a:xfrm>
+            <a:off x="838200" y="681037"/>
+            <a:ext cx="10515600" cy="1325563"/>
+          </a:xfrm>
+        </p:spPr>
+        <p:txBody>
+          <a:bodyPr/>
+          <a:lstStyle/>
+          <a:p>
+            <a:r>
+              <a:rPr lang="en-US" altLang="zh-CN" dirty="0"/>
+              <a:t>Case 2: Dynamic routing </a:t>
+            </a:r>
+            <a:endParaRPr lang="zh-CN" altLang="en-US" dirty="0"/>
+          </a:p>
+        </p:txBody>
+      </p:sp>
+      <p:sp>
+        <p:nvSpPr>
+          <p:cNvPr id="5" name="内容占位符 4">
+            <a:extLst>
+              <a:ext uri="{FF2B5EF4-FFF2-40B4-BE49-F238E27FC236}">
+                <a16:creationId xmlns:a16="http://schemas.microsoft.com/office/drawing/2014/main" id="{691D7C80-19FE-A52F-263F-DECA43DEFA71}"/>
+              </a:ext>
+            </a:extLst>
+          </p:cNvPr>
+          <p:cNvSpPr>
+            <a:spLocks noGrp="1"/>
+          </p:cNvSpPr>
+          <p:nvPr>
+            <p:ph idx="1"/>
+          </p:nvPr>
+        </p:nvSpPr>
+        <p:spPr/>
+        <p:txBody>
+          <a:bodyPr>
+            <a:normAutofit lnSpcReduction="10000"/>
+          </a:bodyPr>
+          <a:lstStyle/>
+          <a:p>
+            <a:pPr>
+              <a:lnSpc>
+                <a:spcPct val="150000"/>
+              </a:lnSpc>
+            </a:pPr>
+            <a:r>
+              <a:rPr lang="en-US" altLang="zh-CN" dirty="0"/>
+              <a:t>New node discovery: </a:t>
+            </a:r>
+          </a:p>
+          <a:p>
+            <a:pPr marL="0" indent="0">
+              <a:lnSpc>
+                <a:spcPct val="150000"/>
+              </a:lnSpc>
+              <a:buNone/>
+            </a:pPr>
+            <a:r>
+              <a:rPr lang="en-US" altLang="zh-CN" dirty="0"/>
+              <a:t>	1. turn on a new board (e.g. node 6)</a:t>
+            </a:r>
+          </a:p>
+          <a:p>
+            <a:pPr marL="0" indent="0">
+              <a:lnSpc>
+                <a:spcPct val="150000"/>
+              </a:lnSpc>
+              <a:buNone/>
+            </a:pPr>
+            <a:r>
+              <a:rPr lang="en-US" altLang="zh-CN" dirty="0"/>
+              <a:t>	2. Node listens to channel 12 for 5 times </a:t>
+            </a:r>
+          </a:p>
+          <a:p>
+            <a:pPr marL="0" indent="0">
+              <a:lnSpc>
+                <a:spcPct val="150000"/>
+              </a:lnSpc>
+              <a:buNone/>
+            </a:pPr>
+            <a:r>
+              <a:rPr lang="en-US" altLang="zh-CN" dirty="0"/>
+              <a:t>	3. if no flooding message is received </a:t>
+            </a:r>
+          </a:p>
+          <a:p>
+            <a:pPr marL="0" indent="0">
+              <a:lnSpc>
+                <a:spcPct val="150000"/>
+              </a:lnSpc>
+              <a:buNone/>
+            </a:pPr>
+            <a:r>
+              <a:rPr lang="en-US" altLang="zh-CN" dirty="0"/>
+              <a:t>	4. send discovery signal to neighbor nodes </a:t>
+            </a:r>
+          </a:p>
+          <a:p>
+            <a:pPr marL="0" indent="0">
+              <a:lnSpc>
+                <a:spcPct val="150000"/>
+              </a:lnSpc>
+              <a:buNone/>
+            </a:pPr>
+            <a:r>
+              <a:rPr lang="en-US" altLang="zh-CN" dirty="0"/>
+              <a:t>	5. master initialize network reset </a:t>
+            </a:r>
+          </a:p>
+          <a:p>
+            <a:pPr marL="0" indent="0">
+              <a:lnSpc>
+                <a:spcPct val="150000"/>
+              </a:lnSpc>
+              <a:buNone/>
+            </a:pPr>
+            <a:endParaRPr lang="en-US" altLang="zh-CN" dirty="0"/>
+          </a:p>
+          <a:p>
+            <a:pPr marL="0" indent="0">
+              <a:buNone/>
+            </a:pPr>
+            <a:endParaRPr lang="zh-CN" altLang="en-US" dirty="0"/>
+          </a:p>
+        </p:txBody>
+      </p:sp>
+    </p:spTree>
+    <p:extLst>
+      <p:ext uri="{BB962C8B-B14F-4D97-AF65-F5344CB8AC3E}">
+        <p14:creationId xmlns:p14="http://schemas.microsoft.com/office/powerpoint/2010/main" val="1376155735"/>
+      </p:ext>
+    </p:extLst>
+  </p:cSld>
+  <p:clrMapOvr>
+    <a:masterClrMapping/>
+  </p:clrMapOvr>
+</p:sld>
+</file>
+
+<file path=ppt/slides/slide14.xml><?xml version="1.0" encoding="utf-8"?>
+<p:sld xmlns:a="http://schemas.openxmlformats.org/drawingml/2006/main" xmlns:r="http://schemas.openxmlformats.org/officeDocument/2006/relationships" xmlns:p="http://schemas.openxmlformats.org/presentationml/2006/main">
+  <p:cSld>
+    <p:spTree>
+      <p:nvGrpSpPr>
+        <p:cNvPr id="1" name="">
+          <a:extLst>
+            <a:ext uri="{FF2B5EF4-FFF2-40B4-BE49-F238E27FC236}">
+              <a16:creationId xmlns:a16="http://schemas.microsoft.com/office/drawing/2014/main" id="{FAFD2680-F76C-34B5-1D4C-8D08503A56C6}"/>
+            </a:ext>
+          </a:extLst>
+        </p:cNvPr>
+        <p:cNvGrpSpPr/>
+        <p:nvPr/>
+      </p:nvGrpSpPr>
+      <p:grpSpPr>
+        <a:xfrm>
+          <a:off x="0" y="0"/>
+          <a:ext cx="0" cy="0"/>
+          <a:chOff x="0" y="0"/>
+          <a:chExt cx="0" cy="0"/>
+        </a:xfrm>
+      </p:grpSpPr>
+      <p:sp>
+        <p:nvSpPr>
+          <p:cNvPr id="4" name="标题 3">
+            <a:extLst>
+              <a:ext uri="{FF2B5EF4-FFF2-40B4-BE49-F238E27FC236}">
+                <a16:creationId xmlns:a16="http://schemas.microsoft.com/office/drawing/2014/main" id="{4AD5A190-036A-E844-2AEA-0CD5AF2DD0AE}"/>
+              </a:ext>
+            </a:extLst>
+          </p:cNvPr>
+          <p:cNvSpPr>
+            <a:spLocks noGrp="1"/>
+          </p:cNvSpPr>
+          <p:nvPr>
+            <p:ph type="title"/>
+          </p:nvPr>
+        </p:nvSpPr>
+        <p:spPr>
+          <a:xfrm>
+            <a:off x="838200" y="681037"/>
+            <a:ext cx="10515600" cy="1325563"/>
+          </a:xfrm>
+        </p:spPr>
+        <p:txBody>
+          <a:bodyPr/>
+          <a:lstStyle/>
+          <a:p>
+            <a:r>
+              <a:rPr lang="en-US" altLang="zh-CN" dirty="0"/>
+              <a:t>Case 2: Dynamic routing </a:t>
+            </a:r>
+            <a:endParaRPr lang="zh-CN" altLang="en-US" dirty="0"/>
+          </a:p>
+        </p:txBody>
+      </p:sp>
+      <p:sp>
+        <p:nvSpPr>
+          <p:cNvPr id="5" name="内容占位符 4">
+            <a:extLst>
+              <a:ext uri="{FF2B5EF4-FFF2-40B4-BE49-F238E27FC236}">
+                <a16:creationId xmlns:a16="http://schemas.microsoft.com/office/drawing/2014/main" id="{75F21884-71FD-EF92-B9EF-9781A94CCF58}"/>
+              </a:ext>
+            </a:extLst>
+          </p:cNvPr>
+          <p:cNvSpPr>
+            <a:spLocks noGrp="1"/>
+          </p:cNvSpPr>
+          <p:nvPr>
+            <p:ph idx="1"/>
+          </p:nvPr>
+        </p:nvSpPr>
+        <p:spPr/>
+        <p:txBody>
+          <a:bodyPr>
+            <a:normAutofit/>
+          </a:bodyPr>
+          <a:lstStyle/>
+          <a:p>
+            <a:pPr>
+              <a:lnSpc>
+                <a:spcPct val="150000"/>
+              </a:lnSpc>
+            </a:pPr>
+            <a:r>
+              <a:rPr lang="en-US" altLang="zh-CN" dirty="0"/>
+              <a:t>Existing node failure: </a:t>
+            </a:r>
+          </a:p>
+          <a:p>
+            <a:pPr marL="914400" lvl="1" indent="-457200">
+              <a:lnSpc>
+                <a:spcPct val="150000"/>
+              </a:lnSpc>
+              <a:buAutoNum type="arabicPeriod"/>
+            </a:pPr>
+            <a:r>
+              <a:rPr lang="en-US" altLang="zh-CN" dirty="0"/>
+              <a:t>turn off a working node (simulate node failure)</a:t>
+            </a:r>
+          </a:p>
+          <a:p>
+            <a:pPr marL="914400" lvl="1" indent="-457200">
+              <a:lnSpc>
+                <a:spcPct val="150000"/>
+              </a:lnSpc>
+              <a:buAutoNum type="arabicPeriod"/>
+            </a:pPr>
+            <a:r>
+              <a:rPr lang="en-US" altLang="zh-CN" dirty="0"/>
+              <a:t>master does not receive its heartbeat signal </a:t>
+            </a:r>
+          </a:p>
+          <a:p>
+            <a:pPr marL="914400" lvl="1" indent="-457200">
+              <a:lnSpc>
+                <a:spcPct val="150000"/>
+              </a:lnSpc>
+              <a:buAutoNum type="arabicPeriod"/>
+            </a:pPr>
+            <a:r>
+              <a:rPr lang="en-US" altLang="zh-CN" dirty="0"/>
+              <a:t>master initialize network reset </a:t>
+            </a:r>
+          </a:p>
+          <a:p>
+            <a:pPr marL="0" indent="0">
+              <a:lnSpc>
+                <a:spcPct val="150000"/>
+              </a:lnSpc>
+              <a:buNone/>
+            </a:pPr>
+            <a:endParaRPr lang="en-US" altLang="zh-CN" dirty="0"/>
+          </a:p>
+          <a:p>
+            <a:pPr marL="0" indent="0">
+              <a:buNone/>
+            </a:pPr>
+            <a:endParaRPr lang="zh-CN" altLang="en-US" dirty="0"/>
+          </a:p>
+        </p:txBody>
+      </p:sp>
+    </p:spTree>
+    <p:extLst>
+      <p:ext uri="{BB962C8B-B14F-4D97-AF65-F5344CB8AC3E}">
+        <p14:creationId xmlns:p14="http://schemas.microsoft.com/office/powerpoint/2010/main" val="83175394"/>
+      </p:ext>
+    </p:extLst>
+  </p:cSld>
+  <p:clrMapOvr>
+    <a:masterClrMapping/>
+  </p:clrMapOvr>
+</p:sld>
+</file>
+
+<file path=ppt/slides/slide15.xml><?xml version="1.0" encoding="utf-8"?>
+<p:sld xmlns:a="http://schemas.openxmlformats.org/drawingml/2006/main" xmlns:r="http://schemas.openxmlformats.org/officeDocument/2006/relationships" xmlns:p="http://schemas.openxmlformats.org/presentationml/2006/main">
+  <p:cSld>
+    <p:spTree>
+      <p:nvGrpSpPr>
+        <p:cNvPr id="1" name="">
+          <a:extLst>
+            <a:ext uri="{FF2B5EF4-FFF2-40B4-BE49-F238E27FC236}">
+              <a16:creationId xmlns:a16="http://schemas.microsoft.com/office/drawing/2014/main" id="{7670DE80-71AA-BBC3-FF9D-4B97D0CFDC7D}"/>
+            </a:ext>
+          </a:extLst>
+        </p:cNvPr>
+        <p:cNvGrpSpPr/>
+        <p:nvPr/>
+      </p:nvGrpSpPr>
+      <p:grpSpPr>
+        <a:xfrm>
+          <a:off x="0" y="0"/>
+          <a:ext cx="0" cy="0"/>
+          <a:chOff x="0" y="0"/>
+          <a:chExt cx="0" cy="0"/>
+        </a:xfrm>
+      </p:grpSpPr>
+      <p:sp>
+        <p:nvSpPr>
+          <p:cNvPr id="4" name="标题 3">
+            <a:extLst>
+              <a:ext uri="{FF2B5EF4-FFF2-40B4-BE49-F238E27FC236}">
+                <a16:creationId xmlns:a16="http://schemas.microsoft.com/office/drawing/2014/main" id="{9DB51283-FE0C-A834-19B7-C2138A6A2CAF}"/>
+              </a:ext>
+            </a:extLst>
+          </p:cNvPr>
+          <p:cNvSpPr>
+            <a:spLocks noGrp="1"/>
+          </p:cNvSpPr>
+          <p:nvPr>
+            <p:ph type="title"/>
+          </p:nvPr>
+        </p:nvSpPr>
+        <p:spPr>
+          <a:xfrm>
+            <a:off x="838200" y="681649"/>
+            <a:ext cx="8575431" cy="1325563"/>
+          </a:xfrm>
+        </p:spPr>
+        <p:txBody>
+          <a:bodyPr/>
+          <a:lstStyle/>
+          <a:p>
+            <a:r>
+              <a:rPr lang="en-US" altLang="zh-CN" dirty="0"/>
+              <a:t>Case 3: Reactive network</a:t>
+            </a:r>
+            <a:endParaRPr lang="zh-CN" altLang="en-US" dirty="0"/>
+          </a:p>
+        </p:txBody>
+      </p:sp>
+      <p:sp>
+        <p:nvSpPr>
+          <p:cNvPr id="5" name="内容占位符 4">
+            <a:extLst>
+              <a:ext uri="{FF2B5EF4-FFF2-40B4-BE49-F238E27FC236}">
+                <a16:creationId xmlns:a16="http://schemas.microsoft.com/office/drawing/2014/main" id="{7767E8BA-A499-793E-711B-4BE85D248262}"/>
+              </a:ext>
+            </a:extLst>
+          </p:cNvPr>
+          <p:cNvSpPr>
+            <a:spLocks noGrp="1"/>
+          </p:cNvSpPr>
+          <p:nvPr>
+            <p:ph idx="1"/>
+          </p:nvPr>
+        </p:nvSpPr>
+        <p:spPr>
+          <a:xfrm>
+            <a:off x="838200" y="2223598"/>
+            <a:ext cx="10515600" cy="4351338"/>
+          </a:xfrm>
+        </p:spPr>
+        <p:txBody>
+          <a:bodyPr/>
+          <a:lstStyle/>
+          <a:p>
+            <a:pPr>
+              <a:lnSpc>
+                <a:spcPct val="150000"/>
+              </a:lnSpc>
+            </a:pPr>
+            <a:r>
+              <a:rPr lang="en-US" altLang="zh-CN" dirty="0"/>
+              <a:t>Sensor value will only be transmitted and displayed when it changes dramatically (change of light &gt; 50 lux or distance &gt; 10cm)</a:t>
+            </a:r>
+            <a:endParaRPr lang="zh-CN" altLang="en-US" dirty="0"/>
+          </a:p>
+        </p:txBody>
+      </p:sp>
+    </p:spTree>
+    <p:extLst>
+      <p:ext uri="{BB962C8B-B14F-4D97-AF65-F5344CB8AC3E}">
+        <p14:creationId xmlns:p14="http://schemas.microsoft.com/office/powerpoint/2010/main" val="3782980413"/>
+      </p:ext>
+    </p:extLst>
+  </p:cSld>
+  <p:clrMapOvr>
+    <a:masterClrMapping/>
+  </p:clrMapOvr>
+</p:sld>
+</file>
+
+<file path=ppt/slides/slide16.xml><?xml version="1.0" encoding="utf-8"?>
+<p:sld xmlns:a="http://schemas.openxmlformats.org/drawingml/2006/main" xmlns:r="http://schemas.openxmlformats.org/officeDocument/2006/relationships" xmlns:p="http://schemas.openxmlformats.org/presentationml/2006/main">
+  <p:cSld>
+    <p:spTree>
+      <p:nvGrpSpPr>
+        <p:cNvPr id="1" name="">
+          <a:extLst>
+            <a:ext uri="{FF2B5EF4-FFF2-40B4-BE49-F238E27FC236}">
+              <a16:creationId xmlns:a16="http://schemas.microsoft.com/office/drawing/2014/main" id="{7EB5FBD8-F322-A349-450B-E738F819F082}"/>
+            </a:ext>
+          </a:extLst>
+        </p:cNvPr>
+        <p:cNvGrpSpPr/>
+        <p:nvPr/>
+      </p:nvGrpSpPr>
+      <p:grpSpPr>
+        <a:xfrm>
+          <a:off x="0" y="0"/>
+          <a:ext cx="0" cy="0"/>
+          <a:chOff x="0" y="0"/>
+          <a:chExt cx="0" cy="0"/>
+        </a:xfrm>
+      </p:grpSpPr>
+      <p:sp>
+        <p:nvSpPr>
+          <p:cNvPr id="4" name="标题 3">
+            <a:extLst>
+              <a:ext uri="{FF2B5EF4-FFF2-40B4-BE49-F238E27FC236}">
+                <a16:creationId xmlns:a16="http://schemas.microsoft.com/office/drawing/2014/main" id="{40FEA80F-EC0D-2E34-C8B7-208901881140}"/>
+              </a:ext>
+            </a:extLst>
+          </p:cNvPr>
+          <p:cNvSpPr>
+            <a:spLocks noGrp="1"/>
+          </p:cNvSpPr>
+          <p:nvPr>
+            <p:ph type="title"/>
+          </p:nvPr>
+        </p:nvSpPr>
+        <p:spPr>
+          <a:xfrm>
+            <a:off x="838200" y="500062"/>
+            <a:ext cx="10515600" cy="1325563"/>
+          </a:xfrm>
+        </p:spPr>
+        <p:txBody>
+          <a:bodyPr/>
+          <a:lstStyle/>
+          <a:p>
+            <a:r>
+              <a:rPr lang="en-US" altLang="zh-CN" dirty="0"/>
+              <a:t>Case 4: Low-energy awareness routing</a:t>
+            </a:r>
+            <a:endParaRPr lang="zh-CN" altLang="en-US" dirty="0"/>
+          </a:p>
+        </p:txBody>
+      </p:sp>
+      <p:sp>
+        <p:nvSpPr>
+          <p:cNvPr id="5" name="内容占位符 4">
+            <a:extLst>
+              <a:ext uri="{FF2B5EF4-FFF2-40B4-BE49-F238E27FC236}">
+                <a16:creationId xmlns:a16="http://schemas.microsoft.com/office/drawing/2014/main" id="{1F9CBB7B-50DE-C537-68AD-ACCFF553EDAC}"/>
+              </a:ext>
+            </a:extLst>
+          </p:cNvPr>
+          <p:cNvSpPr>
+            <a:spLocks noGrp="1"/>
+          </p:cNvSpPr>
+          <p:nvPr>
+            <p:ph idx="1"/>
+          </p:nvPr>
+        </p:nvSpPr>
+        <p:spPr>
+          <a:xfrm>
+            <a:off x="838200" y="1925271"/>
+            <a:ext cx="10515600" cy="4351338"/>
+          </a:xfrm>
+        </p:spPr>
+        <p:txBody>
+          <a:bodyPr/>
+          <a:lstStyle/>
+          <a:p>
+            <a:endParaRPr lang="zh-CN" altLang="en-US" dirty="0"/>
+          </a:p>
+        </p:txBody>
+      </p:sp>
+    </p:spTree>
+    <p:extLst>
+      <p:ext uri="{BB962C8B-B14F-4D97-AF65-F5344CB8AC3E}">
+        <p14:creationId xmlns:p14="http://schemas.microsoft.com/office/powerpoint/2010/main" val="1859502817"/>
+      </p:ext>
+    </p:extLst>
+  </p:cSld>
+  <p:clrMapOvr>
+    <a:masterClrMapping/>
+  </p:clrMapOvr>
 </p:sld>
 </file>
 
@@ -9427,7 +9482,7 @@
             </a:pPr>
             <a:r>
               <a:rPr lang="en-US" altLang="zh-CN" sz="2000" dirty="0"/>
-              <a:t>Integrate two sensor types for reliable detection and fault tolerance</a:t>
+              <a:t>Integrate two types of sensor for reliable detection and fault tolerance</a:t>
             </a:r>
             <a:endParaRPr lang="en-US" altLang="zh-CN" sz="1900" dirty="0"/>
           </a:p>
@@ -9443,6 +9498,18 @@
   <p:clrMapOvr>
     <a:masterClrMapping/>
   </p:clrMapOvr>
+  <mc:AlternateContent xmlns:mc="http://schemas.openxmlformats.org/markup-compatibility/2006">
+    <mc:Choice xmlns:p159="http://schemas.microsoft.com/office/powerpoint/2015/09/main" Requires="p159">
+      <p:transition xmlns:p14="http://schemas.microsoft.com/office/powerpoint/2010/main" spd="slow" p14:dur="2000">
+        <p159:morph option="byObject"/>
+      </p:transition>
+    </mc:Choice>
+    <mc:Fallback>
+      <p:transition spd="slow">
+        <p:fade/>
+      </p:transition>
+    </mc:Fallback>
+  </mc:AlternateContent>
 </p:sld>
 </file>
 
@@ -9519,8 +9586,8 @@
         </p:blipFill>
         <p:spPr bwMode="auto">
           <a:xfrm>
-            <a:off x="2325208" y="896815"/>
-            <a:ext cx="7541584" cy="5279109"/>
+            <a:off x="2214750" y="779584"/>
+            <a:ext cx="7762500" cy="5433750"/>
           </a:xfrm>
           <a:prstGeom prst="rect">
             <a:avLst/>
@@ -9547,6 +9614,18 @@
   <p:clrMapOvr>
     <a:masterClrMapping/>
   </p:clrMapOvr>
+  <mc:AlternateContent xmlns:mc="http://schemas.openxmlformats.org/markup-compatibility/2006">
+    <mc:Choice xmlns:p14="http://schemas.microsoft.com/office/powerpoint/2010/main" Requires="p14">
+      <p:transition spd="med" p14:dur="700">
+        <p:fade/>
+      </p:transition>
+    </mc:Choice>
+    <mc:Fallback>
+      <p:transition spd="med">
+        <p:fade/>
+      </p:transition>
+    </mc:Fallback>
+  </mc:AlternateContent>
 </p:sld>
 </file>
 
@@ -10175,6 +10254,9 @@
   <p:clrMapOvr>
     <a:masterClrMapping/>
   </p:clrMapOvr>
+  <p:transition spd="slow">
+    <p:wipe/>
+  </p:transition>
 </p:sld>
 </file>
 
@@ -10579,6 +10661,9 @@
   <p:clrMapOvr>
     <a:masterClrMapping/>
   </p:clrMapOvr>
+  <p:transition spd="slow">
+    <p:wipe/>
+  </p:transition>
 </p:sld>
 </file>
 
@@ -10949,6 +11034,9 @@
   <p:clrMapOvr>
     <a:masterClrMapping/>
   </p:clrMapOvr>
+  <p:transition spd="slow">
+    <p:wipe/>
+  </p:transition>
 </p:sld>
 </file>
 
@@ -11179,6 +11267,9 @@
   <p:clrMapOvr>
     <a:masterClrMapping/>
   </p:clrMapOvr>
+  <p:transition spd="slow">
+    <p:wipe/>
+  </p:transition>
 </p:sld>
 </file>
 
@@ -11222,7 +11313,7 @@
           <a:p>
             <a:r>
               <a:rPr lang="en-US" altLang="zh-CN" dirty="0"/>
-              <a:t>Network in different condition </a:t>
+              <a:t>Network in different states </a:t>
             </a:r>
             <a:endParaRPr lang="zh-CN" altLang="en-US" dirty="0"/>
           </a:p>
@@ -11314,7 +11405,7 @@
         <p:spPr>
           <a:xfrm>
             <a:off x="1037492" y="6060831"/>
-            <a:ext cx="4097216" cy="369277"/>
+            <a:ext cx="4097216" cy="369332"/>
           </a:xfrm>
           <a:prstGeom prst="rect">
             <a:avLst/>
@@ -11329,7 +11420,7 @@
           <a:p>
             <a:r>
               <a:rPr lang="en-US" altLang="zh-CN" dirty="0"/>
-              <a:t>All nodes working -&gt; network constructed </a:t>
+              <a:t>Stable state: all nodes working </a:t>
             </a:r>
             <a:endParaRPr lang="zh-CN" altLang="en-US" dirty="0"/>
           </a:p>
@@ -11350,7 +11441,7 @@
         <p:spPr>
           <a:xfrm>
             <a:off x="6494585" y="6088374"/>
-            <a:ext cx="5193323" cy="369332"/>
+            <a:ext cx="5193323" cy="646331"/>
           </a:xfrm>
           <a:prstGeom prst="rect">
             <a:avLst/>
@@ -11365,7 +11456,7 @@
           <a:p>
             <a:r>
               <a:rPr lang="en-US" altLang="zh-CN" dirty="0"/>
-              <a:t>Only one node is working -&gt; selected as cluster head</a:t>
+              <a:t>Init state: only one node is working -&gt; selected as cluster head</a:t>
             </a:r>
             <a:endParaRPr lang="zh-CN" altLang="en-US" dirty="0"/>
           </a:p>
@@ -11381,6 +11472,9 @@
   <p:clrMapOvr>
     <a:masterClrMapping/>
   </p:clrMapOvr>
+  <p:transition spd="slow">
+    <p:wipe/>
+  </p:transition>
 </p:sld>
 </file>
 
@@ -11477,7 +11571,7 @@
             </a:pPr>
             <a:r>
               <a:rPr lang="en-US" altLang="zh-CN" dirty="0"/>
-              <a:t>Routing decisions consider hop count, RSSI, and battery level</a:t>
+              <a:t>Cluster head selection considers hop count, RSSI, and battery level</a:t>
             </a:r>
           </a:p>
           <a:p>
@@ -11490,22 +11584,32 @@
             </a:pPr>
             <a:r>
               <a:rPr lang="en-US" altLang="zh-CN" dirty="0"/>
-              <a:t>GUI filters short-term value fluctuations to improve display stability and avoid wrong detection</a:t>
-            </a:r>
-          </a:p>
-          <a:p>
-            <a:pPr marL="914400" lvl="1" indent="-457200">
+              <a:t>Sensor data transmission triggered only on significant changes appear </a:t>
+            </a:r>
+          </a:p>
+          <a:p>
+            <a:pPr marL="457200" lvl="1" indent="0">
               <a:lnSpc>
                 <a:spcPct val="150000"/>
               </a:lnSpc>
-              <a:buFont typeface="+mj-lt"/>
-              <a:buAutoNum type="arabicPeriod"/>
+              <a:buNone/>
             </a:pPr>
             <a:r>
               <a:rPr lang="en-US" altLang="zh-CN" dirty="0"/>
-              <a:t>Sensor data transmission triggered only on significant changes</a:t>
-            </a:r>
-            <a:endParaRPr lang="zh-CN" altLang="en-US" dirty="0"/>
+              <a:t>	-&gt; energy saving</a:t>
+            </a:r>
+          </a:p>
+          <a:p>
+            <a:pPr marL="457200" lvl="1" indent="0">
+              <a:lnSpc>
+                <a:spcPct val="150000"/>
+              </a:lnSpc>
+              <a:buNone/>
+            </a:pPr>
+            <a:r>
+              <a:rPr lang="en-US" altLang="zh-CN" dirty="0"/>
+              <a:t>4.   GUI filters short-term value fluctuations to improve display stability and avoid wrong detection</a:t>
+            </a:r>
           </a:p>
         </p:txBody>
       </p:sp>
@@ -11538,8 +11642,8 @@
         </p:blipFill>
         <p:spPr bwMode="auto">
           <a:xfrm>
-            <a:off x="4047027" y="5105399"/>
-            <a:ext cx="2366915" cy="1471979"/>
+            <a:off x="6151320" y="4978140"/>
+            <a:ext cx="2863726" cy="1780945"/>
           </a:xfrm>
           <a:prstGeom prst="rect">
             <a:avLst/>
@@ -11566,6 +11670,9 @@
   <p:clrMapOvr>
     <a:masterClrMapping/>
   </p:clrMapOvr>
+  <p:transition spd="slow">
+    <p:wipe/>
+  </p:transition>
 </p:sld>
 </file>
 

</xml_diff>